<commit_message>
Update Snowflake data warehouse.pptx
</commit_message>
<xml_diff>
--- a/sessions/ChennaiAzureUserGroup/Snowflake_DW/Snowflake data warehouse.pptx
+++ b/sessions/ChennaiAzureUserGroup/Snowflake_DW/Snowflake data warehouse.pptx
@@ -5,25 +5,33 @@
     <p:sldMasterId id="2147483660" r:id="rId1"/>
   </p:sldMasterIdLst>
   <p:notesMasterIdLst>
-    <p:notesMasterId r:id="rId18"/>
+    <p:notesMasterId r:id="rId26"/>
   </p:notesMasterIdLst>
   <p:sldIdLst>
     <p:sldId id="256" r:id="rId2"/>
     <p:sldId id="257" r:id="rId3"/>
     <p:sldId id="267" r:id="rId4"/>
     <p:sldId id="292" r:id="rId5"/>
-    <p:sldId id="258" r:id="rId6"/>
+    <p:sldId id="2076136277" r:id="rId6"/>
     <p:sldId id="276" r:id="rId7"/>
-    <p:sldId id="263" r:id="rId8"/>
-    <p:sldId id="264" r:id="rId9"/>
-    <p:sldId id="2076136270" r:id="rId10"/>
-    <p:sldId id="2076136271" r:id="rId11"/>
-    <p:sldId id="2076136275" r:id="rId12"/>
-    <p:sldId id="2076136272" r:id="rId13"/>
-    <p:sldId id="2076136273" r:id="rId14"/>
-    <p:sldId id="2076136274" r:id="rId15"/>
-    <p:sldId id="266" r:id="rId16"/>
-    <p:sldId id="2076136268" r:id="rId17"/>
+    <p:sldId id="2076136279" r:id="rId8"/>
+    <p:sldId id="2076136280" r:id="rId9"/>
+    <p:sldId id="2076136282" r:id="rId10"/>
+    <p:sldId id="2076136285" r:id="rId11"/>
+    <p:sldId id="2076136283" r:id="rId12"/>
+    <p:sldId id="2076136290" r:id="rId13"/>
+    <p:sldId id="2076136284" r:id="rId14"/>
+    <p:sldId id="2076136292" r:id="rId15"/>
+    <p:sldId id="2076136271" r:id="rId16"/>
+    <p:sldId id="2076136272" r:id="rId17"/>
+    <p:sldId id="2076136273" r:id="rId18"/>
+    <p:sldId id="2076136274" r:id="rId19"/>
+    <p:sldId id="2076136288" r:id="rId20"/>
+    <p:sldId id="2076136293" r:id="rId21"/>
+    <p:sldId id="2076136289" r:id="rId22"/>
+    <p:sldId id="2076136291" r:id="rId23"/>
+    <p:sldId id="266" r:id="rId24"/>
+    <p:sldId id="2076136287" r:id="rId25"/>
   </p:sldIdLst>
   <p:sldSz cx="12192000" cy="6858000"/>
   <p:notesSz cx="6858000" cy="9144000"/>
@@ -212,7 +220,7 @@
           <a:p>
             <a:fld id="{5504A8C5-2585-44C9-B0E5-24F06DD964F4}" type="datetimeFigureOut">
               <a:rPr lang="en-IN" smtClean="0"/>
-              <a:t>31-05-2021</a:t>
+              <a:t>05-06-2021</a:t>
             </a:fld>
             <a:endParaRPr lang="en-IN"/>
           </a:p>
@@ -606,107 +614,6 @@
 </p:notes>
 </file>
 
-<file path=ppt/notesSlides/notesSlide10.xml><?xml version="1.0" encoding="utf-8"?>
-<p:notes xmlns:a="http://schemas.openxmlformats.org/drawingml/2006/main" xmlns:r="http://schemas.openxmlformats.org/officeDocument/2006/relationships" xmlns:p="http://schemas.openxmlformats.org/presentationml/2006/main">
-  <p:cSld>
-    <p:spTree>
-      <p:nvGrpSpPr>
-        <p:cNvPr id="1" name=""/>
-        <p:cNvGrpSpPr/>
-        <p:nvPr/>
-      </p:nvGrpSpPr>
-      <p:grpSpPr>
-        <a:xfrm>
-          <a:off x="0" y="0"/>
-          <a:ext cx="0" cy="0"/>
-          <a:chOff x="0" y="0"/>
-          <a:chExt cx="0" cy="0"/>
-        </a:xfrm>
-      </p:grpSpPr>
-      <p:sp>
-        <p:nvSpPr>
-          <p:cNvPr id="2" name="Slide Image Placeholder 1"/>
-          <p:cNvSpPr>
-            <a:spLocks noGrp="1" noRot="1" noChangeAspect="1"/>
-          </p:cNvSpPr>
-          <p:nvPr>
-            <p:ph type="sldImg"/>
-          </p:nvPr>
-        </p:nvSpPr>
-        <p:spPr/>
-      </p:sp>
-      <p:sp>
-        <p:nvSpPr>
-          <p:cNvPr id="3" name="Notes Placeholder 2"/>
-          <p:cNvSpPr>
-            <a:spLocks noGrp="1"/>
-          </p:cNvSpPr>
-          <p:nvPr>
-            <p:ph type="body" idx="1"/>
-          </p:nvPr>
-        </p:nvSpPr>
-        <p:spPr/>
-        <p:txBody>
-          <a:bodyPr/>
-          <a:lstStyle/>
-          <a:p>
-            <a:pPr marL="0" marR="0" lvl="0" indent="0" algn="l" defTabSz="914400" rtl="0" eaLnBrk="1" fontAlgn="auto" latinLnBrk="0" hangingPunct="1">
-              <a:lnSpc>
-                <a:spcPct val="100000"/>
-              </a:lnSpc>
-              <a:spcBef>
-                <a:spcPts val="0"/>
-              </a:spcBef>
-              <a:spcAft>
-                <a:spcPts val="0"/>
-              </a:spcAft>
-              <a:buClrTx/>
-              <a:buSzTx/>
-              <a:buFontTx/>
-              <a:buNone/>
-              <a:tabLst/>
-              <a:defRPr/>
-            </a:pPr>
-            <a:endParaRPr lang="en-GB" dirty="0"/>
-          </a:p>
-        </p:txBody>
-      </p:sp>
-      <p:sp>
-        <p:nvSpPr>
-          <p:cNvPr id="4" name="Slide Number Placeholder 3"/>
-          <p:cNvSpPr>
-            <a:spLocks noGrp="1"/>
-          </p:cNvSpPr>
-          <p:nvPr>
-            <p:ph type="sldNum" sz="quarter" idx="5"/>
-          </p:nvPr>
-        </p:nvSpPr>
-        <p:spPr/>
-        <p:txBody>
-          <a:bodyPr/>
-          <a:lstStyle/>
-          <a:p>
-            <a:fld id="{61D11EEE-6408-426C-86EC-A45CD40E17C7}" type="slidenum">
-              <a:rPr lang="en-IN" smtClean="0"/>
-              <a:t>15</a:t>
-            </a:fld>
-            <a:endParaRPr lang="en-IN"/>
-          </a:p>
-        </p:txBody>
-      </p:sp>
-    </p:spTree>
-    <p:extLst>
-      <p:ext uri="{BB962C8B-B14F-4D97-AF65-F5344CB8AC3E}">
-        <p14:creationId xmlns:p14="http://schemas.microsoft.com/office/powerpoint/2010/main" val="2019999900"/>
-      </p:ext>
-    </p:extLst>
-  </p:cSld>
-  <p:clrMapOvr>
-    <a:masterClrMapping/>
-  </p:clrMapOvr>
-</p:notes>
-</file>
-
 <file path=ppt/notesSlides/notesSlide2.xml><?xml version="1.0" encoding="utf-8"?>
 <p:notes xmlns:a="http://schemas.openxmlformats.org/drawingml/2006/main" xmlns:r="http://schemas.openxmlformats.org/officeDocument/2006/relationships" xmlns:p="http://schemas.openxmlformats.org/presentationml/2006/main">
   <p:cSld>
@@ -961,108 +868,6 @@
           <a:bodyPr/>
           <a:lstStyle/>
           <a:p>
-            <a:pPr marL="171450" indent="-171450">
-              <a:buFont typeface="Arial" panose="020B0604020202020204" pitchFamily="34" charset="0"/>
-              <a:buChar char="•"/>
-            </a:pPr>
-            <a:r>
-              <a:rPr lang="en-GB" dirty="0"/>
-              <a:t>Size is not an issue as per a database’s doc. But generally not used for big data.</a:t>
-            </a:r>
-          </a:p>
-          <a:p>
-            <a:pPr marL="171450" indent="-171450">
-              <a:buFont typeface="Arial" panose="020B0604020202020204" pitchFamily="34" charset="0"/>
-              <a:buChar char="•"/>
-            </a:pPr>
-            <a:r>
-              <a:rPr lang="en-GB" dirty="0"/>
-              <a:t>OLAP cubes are possible in RDBMS, but it need to be prepared before analytics. Which is what I mean for ad-hoc.</a:t>
-            </a:r>
-            <a:endParaRPr lang="en-IN" dirty="0"/>
-          </a:p>
-        </p:txBody>
-      </p:sp>
-      <p:sp>
-        <p:nvSpPr>
-          <p:cNvPr id="4" name="Slide Number Placeholder 3"/>
-          <p:cNvSpPr>
-            <a:spLocks noGrp="1"/>
-          </p:cNvSpPr>
-          <p:nvPr>
-            <p:ph type="sldNum" sz="quarter" idx="5"/>
-          </p:nvPr>
-        </p:nvSpPr>
-        <p:spPr/>
-        <p:txBody>
-          <a:bodyPr/>
-          <a:lstStyle/>
-          <a:p>
-            <a:fld id="{61D11EEE-6408-426C-86EC-A45CD40E17C7}" type="slidenum">
-              <a:rPr lang="en-IN" smtClean="0"/>
-              <a:t>5</a:t>
-            </a:fld>
-            <a:endParaRPr lang="en-IN"/>
-          </a:p>
-        </p:txBody>
-      </p:sp>
-    </p:spTree>
-    <p:extLst>
-      <p:ext uri="{BB962C8B-B14F-4D97-AF65-F5344CB8AC3E}">
-        <p14:creationId xmlns:p14="http://schemas.microsoft.com/office/powerpoint/2010/main" val="1510584662"/>
-      </p:ext>
-    </p:extLst>
-  </p:cSld>
-  <p:clrMapOvr>
-    <a:masterClrMapping/>
-  </p:clrMapOvr>
-</p:notes>
-</file>
-
-<file path=ppt/notesSlides/notesSlide5.xml><?xml version="1.0" encoding="utf-8"?>
-<p:notes xmlns:a="http://schemas.openxmlformats.org/drawingml/2006/main" xmlns:r="http://schemas.openxmlformats.org/officeDocument/2006/relationships" xmlns:p="http://schemas.openxmlformats.org/presentationml/2006/main">
-  <p:cSld>
-    <p:spTree>
-      <p:nvGrpSpPr>
-        <p:cNvPr id="1" name=""/>
-        <p:cNvGrpSpPr/>
-        <p:nvPr/>
-      </p:nvGrpSpPr>
-      <p:grpSpPr>
-        <a:xfrm>
-          <a:off x="0" y="0"/>
-          <a:ext cx="0" cy="0"/>
-          <a:chOff x="0" y="0"/>
-          <a:chExt cx="0" cy="0"/>
-        </a:xfrm>
-      </p:grpSpPr>
-      <p:sp>
-        <p:nvSpPr>
-          <p:cNvPr id="2" name="Slide Image Placeholder 1"/>
-          <p:cNvSpPr>
-            <a:spLocks noGrp="1" noRot="1" noChangeAspect="1"/>
-          </p:cNvSpPr>
-          <p:nvPr>
-            <p:ph type="sldImg"/>
-          </p:nvPr>
-        </p:nvSpPr>
-        <p:spPr/>
-      </p:sp>
-      <p:sp>
-        <p:nvSpPr>
-          <p:cNvPr id="3" name="Notes Placeholder 2"/>
-          <p:cNvSpPr>
-            <a:spLocks noGrp="1"/>
-          </p:cNvSpPr>
-          <p:nvPr>
-            <p:ph type="body" idx="1"/>
-          </p:nvPr>
-        </p:nvSpPr>
-        <p:spPr/>
-        <p:txBody>
-          <a:bodyPr/>
-          <a:lstStyle/>
-          <a:p>
             <a:r>
               <a:rPr lang="en-GB" dirty="0"/>
               <a:t>NoSQL </a:t>
@@ -1162,7 +967,7 @@
 </p:notes>
 </file>
 
-<file path=ppt/notesSlides/notesSlide6.xml><?xml version="1.0" encoding="utf-8"?>
+<file path=ppt/notesSlides/notesSlide5.xml><?xml version="1.0" encoding="utf-8"?>
 <p:notes xmlns:a="http://schemas.openxmlformats.org/drawingml/2006/main" xmlns:r="http://schemas.openxmlformats.org/officeDocument/2006/relationships" xmlns:p="http://schemas.openxmlformats.org/presentationml/2006/main">
   <p:cSld>
     <p:spTree>
@@ -1206,199 +1011,44 @@
           <a:bodyPr/>
           <a:lstStyle/>
           <a:p>
+            <a:pPr marL="171450" indent="-171450">
+              <a:buFont typeface="Arial" panose="020B0604020202020204" pitchFamily="34" charset="0"/>
+              <a:buChar char="•"/>
+            </a:pPr>
             <a:r>
-              <a:rPr lang="en-GB" dirty="0"/>
-              <a:t>* Data will be converted to proprietary software’s format. While leaving out, the vendor will export it to a common format like parquet or ORC. </a:t>
+              <a:rPr lang="en-IN" dirty="0"/>
+              <a:t>Store all your data.</a:t>
             </a:r>
           </a:p>
           <a:p>
+            <a:pPr marL="171450" indent="-171450">
+              <a:buFont typeface="Arial" panose="020B0604020202020204" pitchFamily="34" charset="0"/>
+              <a:buChar char="•"/>
+            </a:pPr>
             <a:r>
-              <a:rPr lang="en-GB" dirty="0"/>
-              <a:t>* Image - Snowflake has a data type called ‘BINARY’. Still not recommended. Rather you can decide to store the URL that points to that image/video stored in data lakes like S3.</a:t>
+              <a:rPr lang="en-IN" dirty="0"/>
+              <a:t>Extreme simplicity.</a:t>
             </a:r>
-            <a:endParaRPr lang="en-IN" dirty="0"/>
           </a:p>
-        </p:txBody>
-      </p:sp>
-      <p:sp>
-        <p:nvSpPr>
-          <p:cNvPr id="4" name="Slide Number Placeholder 3"/>
-          <p:cNvSpPr>
-            <a:spLocks noGrp="1"/>
-          </p:cNvSpPr>
-          <p:nvPr>
-            <p:ph type="sldNum" sz="quarter" idx="5"/>
-          </p:nvPr>
-        </p:nvSpPr>
-        <p:spPr/>
-        <p:txBody>
-          <a:bodyPr/>
-          <a:lstStyle/>
           <a:p>
-            <a:fld id="{61D11EEE-6408-426C-86EC-A45CD40E17C7}" type="slidenum">
-              <a:rPr lang="en-IN" smtClean="0"/>
-              <a:t>7</a:t>
-            </a:fld>
-            <a:endParaRPr lang="en-IN"/>
+            <a:pPr marL="171450" indent="-171450">
+              <a:buFont typeface="Arial" panose="020B0604020202020204" pitchFamily="34" charset="0"/>
+              <a:buChar char="•"/>
+            </a:pPr>
+            <a:r>
+              <a:rPr lang="en-IN" dirty="0"/>
+              <a:t>Full support for ACID transactions with read consistency.</a:t>
+            </a:r>
           </a:p>
-        </p:txBody>
-      </p:sp>
-    </p:spTree>
-    <p:extLst>
-      <p:ext uri="{BB962C8B-B14F-4D97-AF65-F5344CB8AC3E}">
-        <p14:creationId xmlns:p14="http://schemas.microsoft.com/office/powerpoint/2010/main" val="2093567089"/>
-      </p:ext>
-    </p:extLst>
-  </p:cSld>
-  <p:clrMapOvr>
-    <a:masterClrMapping/>
-  </p:clrMapOvr>
-</p:notes>
-</file>
-
-<file path=ppt/notesSlides/notesSlide7.xml><?xml version="1.0" encoding="utf-8"?>
-<p:notes xmlns:a="http://schemas.openxmlformats.org/drawingml/2006/main" xmlns:r="http://schemas.openxmlformats.org/officeDocument/2006/relationships" xmlns:p="http://schemas.openxmlformats.org/presentationml/2006/main">
-  <p:cSld>
-    <p:spTree>
-      <p:nvGrpSpPr>
-        <p:cNvPr id="1" name=""/>
-        <p:cNvGrpSpPr/>
-        <p:nvPr/>
-      </p:nvGrpSpPr>
-      <p:grpSpPr>
-        <a:xfrm>
-          <a:off x="0" y="0"/>
-          <a:ext cx="0" cy="0"/>
-          <a:chOff x="0" y="0"/>
-          <a:chExt cx="0" cy="0"/>
-        </a:xfrm>
-      </p:grpSpPr>
-      <p:sp>
-        <p:nvSpPr>
-          <p:cNvPr id="2" name="Slide Image Placeholder 1"/>
-          <p:cNvSpPr>
-            <a:spLocks noGrp="1" noRot="1" noChangeAspect="1"/>
-          </p:cNvSpPr>
-          <p:nvPr>
-            <p:ph type="sldImg"/>
-          </p:nvPr>
-        </p:nvSpPr>
-        <p:spPr/>
-      </p:sp>
-      <p:sp>
-        <p:nvSpPr>
-          <p:cNvPr id="3" name="Notes Placeholder 2"/>
-          <p:cNvSpPr>
-            <a:spLocks noGrp="1"/>
-          </p:cNvSpPr>
-          <p:nvPr>
-            <p:ph type="body" idx="1"/>
-          </p:nvPr>
-        </p:nvSpPr>
-        <p:spPr/>
-        <p:txBody>
-          <a:bodyPr/>
-          <a:lstStyle/>
           <a:p>
+            <a:pPr marL="171450" indent="-171450">
+              <a:buFont typeface="Arial" panose="020B0604020202020204" pitchFamily="34" charset="0"/>
+              <a:buChar char="•"/>
+            </a:pPr>
             <a:r>
-              <a:rPr lang="en-GB" dirty="0"/>
-              <a:t>* There wont be any conversion or hard-copying between systems. Data relies in 1 single place and all external systems access over same data. So data democratization is good while using data lake.</a:t>
+              <a:rPr lang="en-IN" dirty="0"/>
+              <a:t>ANSI SQL, RBAC.</a:t>
             </a:r>
-            <a:endParaRPr lang="en-IN" dirty="0"/>
-          </a:p>
-        </p:txBody>
-      </p:sp>
-      <p:sp>
-        <p:nvSpPr>
-          <p:cNvPr id="4" name="Slide Number Placeholder 3"/>
-          <p:cNvSpPr>
-            <a:spLocks noGrp="1"/>
-          </p:cNvSpPr>
-          <p:nvPr>
-            <p:ph type="sldNum" sz="quarter" idx="5"/>
-          </p:nvPr>
-        </p:nvSpPr>
-        <p:spPr/>
-        <p:txBody>
-          <a:bodyPr/>
-          <a:lstStyle/>
-          <a:p>
-            <a:fld id="{61D11EEE-6408-426C-86EC-A45CD40E17C7}" type="slidenum">
-              <a:rPr lang="en-IN" smtClean="0"/>
-              <a:t>8</a:t>
-            </a:fld>
-            <a:endParaRPr lang="en-IN"/>
-          </a:p>
-        </p:txBody>
-      </p:sp>
-    </p:spTree>
-    <p:extLst>
-      <p:ext uri="{BB962C8B-B14F-4D97-AF65-F5344CB8AC3E}">
-        <p14:creationId xmlns:p14="http://schemas.microsoft.com/office/powerpoint/2010/main" val="1155419419"/>
-      </p:ext>
-    </p:extLst>
-  </p:cSld>
-  <p:clrMapOvr>
-    <a:masterClrMapping/>
-  </p:clrMapOvr>
-</p:notes>
-</file>
-
-<file path=ppt/notesSlides/notesSlide8.xml><?xml version="1.0" encoding="utf-8"?>
-<p:notes xmlns:a="http://schemas.openxmlformats.org/drawingml/2006/main" xmlns:r="http://schemas.openxmlformats.org/officeDocument/2006/relationships" xmlns:p="http://schemas.openxmlformats.org/presentationml/2006/main">
-  <p:cSld>
-    <p:spTree>
-      <p:nvGrpSpPr>
-        <p:cNvPr id="1" name=""/>
-        <p:cNvGrpSpPr/>
-        <p:nvPr/>
-      </p:nvGrpSpPr>
-      <p:grpSpPr>
-        <a:xfrm>
-          <a:off x="0" y="0"/>
-          <a:ext cx="0" cy="0"/>
-          <a:chOff x="0" y="0"/>
-          <a:chExt cx="0" cy="0"/>
-        </a:xfrm>
-      </p:grpSpPr>
-      <p:sp>
-        <p:nvSpPr>
-          <p:cNvPr id="2" name="Slide Image Placeholder 1"/>
-          <p:cNvSpPr>
-            <a:spLocks noGrp="1" noRot="1" noChangeAspect="1"/>
-          </p:cNvSpPr>
-          <p:nvPr>
-            <p:ph type="sldImg"/>
-          </p:nvPr>
-        </p:nvSpPr>
-        <p:spPr/>
-      </p:sp>
-      <p:sp>
-        <p:nvSpPr>
-          <p:cNvPr id="3" name="Notes Placeholder 2"/>
-          <p:cNvSpPr>
-            <a:spLocks noGrp="1"/>
-          </p:cNvSpPr>
-          <p:nvPr>
-            <p:ph type="body" idx="1"/>
-          </p:nvPr>
-        </p:nvSpPr>
-        <p:spPr/>
-        <p:txBody>
-          <a:bodyPr/>
-          <a:lstStyle/>
-          <a:p>
-            <a:r>
-              <a:rPr lang="en-GB" b="0" i="0" dirty="0">
-                <a:solidFill>
-                  <a:srgbClr val="E8EAED"/>
-                </a:solidFill>
-                <a:effectLst/>
-                <a:latin typeface="Roboto" panose="02000000000000000000" pitchFamily="2" charset="0"/>
-              </a:rPr>
-              <a:t>Different use cases of analytics - Data science is one part of it. Data analytics is the major part.</a:t>
-            </a:r>
-            <a:endParaRPr lang="en-IN" dirty="0"/>
           </a:p>
         </p:txBody>
       </p:sp>
@@ -1419,7 +1069,7 @@
           <a:p>
             <a:fld id="{F75603B9-19B4-4D8F-907A-25ED0F1ACBA1}" type="slidenum">
               <a:rPr lang="en-IN" smtClean="0"/>
-              <a:t>9</a:t>
+              <a:t>16</a:t>
             </a:fld>
             <a:endParaRPr lang="en-IN"/>
           </a:p>
@@ -1428,7 +1078,7 @@
     </p:spTree>
     <p:extLst>
       <p:ext uri="{BB962C8B-B14F-4D97-AF65-F5344CB8AC3E}">
-        <p14:creationId xmlns:p14="http://schemas.microsoft.com/office/powerpoint/2010/main" val="3215453878"/>
+        <p14:creationId xmlns:p14="http://schemas.microsoft.com/office/powerpoint/2010/main" val="3662382499"/>
       </p:ext>
     </p:extLst>
   </p:cSld>
@@ -1438,7 +1088,7 @@
 </p:notes>
 </file>
 
-<file path=ppt/notesSlides/notesSlide9.xml><?xml version="1.0" encoding="utf-8"?>
+<file path=ppt/notesSlides/notesSlide6.xml><?xml version="1.0" encoding="utf-8"?>
 <p:notes xmlns:a="http://schemas.openxmlformats.org/drawingml/2006/main" xmlns:r="http://schemas.openxmlformats.org/officeDocument/2006/relationships" xmlns:p="http://schemas.openxmlformats.org/presentationml/2006/main">
   <p:cSld>
     <p:spTree>
@@ -1513,7 +1163,7 @@
           <a:p>
             <a:fld id="{F75603B9-19B4-4D8F-907A-25ED0F1ACBA1}" type="slidenum">
               <a:rPr lang="en-IN" smtClean="0"/>
-              <a:t>13</a:t>
+              <a:t>17</a:t>
             </a:fld>
             <a:endParaRPr lang="en-IN"/>
           </a:p>
@@ -1523,6 +1173,107 @@
     <p:extLst>
       <p:ext uri="{BB962C8B-B14F-4D97-AF65-F5344CB8AC3E}">
         <p14:creationId xmlns:p14="http://schemas.microsoft.com/office/powerpoint/2010/main" val="565460378"/>
+      </p:ext>
+    </p:extLst>
+  </p:cSld>
+  <p:clrMapOvr>
+    <a:masterClrMapping/>
+  </p:clrMapOvr>
+</p:notes>
+</file>
+
+<file path=ppt/notesSlides/notesSlide7.xml><?xml version="1.0" encoding="utf-8"?>
+<p:notes xmlns:a="http://schemas.openxmlformats.org/drawingml/2006/main" xmlns:r="http://schemas.openxmlformats.org/officeDocument/2006/relationships" xmlns:p="http://schemas.openxmlformats.org/presentationml/2006/main">
+  <p:cSld>
+    <p:spTree>
+      <p:nvGrpSpPr>
+        <p:cNvPr id="1" name=""/>
+        <p:cNvGrpSpPr/>
+        <p:nvPr/>
+      </p:nvGrpSpPr>
+      <p:grpSpPr>
+        <a:xfrm>
+          <a:off x="0" y="0"/>
+          <a:ext cx="0" cy="0"/>
+          <a:chOff x="0" y="0"/>
+          <a:chExt cx="0" cy="0"/>
+        </a:xfrm>
+      </p:grpSpPr>
+      <p:sp>
+        <p:nvSpPr>
+          <p:cNvPr id="2" name="Slide Image Placeholder 1"/>
+          <p:cNvSpPr>
+            <a:spLocks noGrp="1" noRot="1" noChangeAspect="1"/>
+          </p:cNvSpPr>
+          <p:nvPr>
+            <p:ph type="sldImg"/>
+          </p:nvPr>
+        </p:nvSpPr>
+        <p:spPr/>
+      </p:sp>
+      <p:sp>
+        <p:nvSpPr>
+          <p:cNvPr id="3" name="Notes Placeholder 2"/>
+          <p:cNvSpPr>
+            <a:spLocks noGrp="1"/>
+          </p:cNvSpPr>
+          <p:nvPr>
+            <p:ph type="body" idx="1"/>
+          </p:nvPr>
+        </p:nvSpPr>
+        <p:spPr/>
+        <p:txBody>
+          <a:bodyPr/>
+          <a:lstStyle/>
+          <a:p>
+            <a:pPr marL="0" marR="0" lvl="0" indent="0" algn="l" defTabSz="914400" rtl="0" eaLnBrk="1" fontAlgn="auto" latinLnBrk="0" hangingPunct="1">
+              <a:lnSpc>
+                <a:spcPct val="100000"/>
+              </a:lnSpc>
+              <a:spcBef>
+                <a:spcPts val="0"/>
+              </a:spcBef>
+              <a:spcAft>
+                <a:spcPts val="0"/>
+              </a:spcAft>
+              <a:buClrTx/>
+              <a:buSzTx/>
+              <a:buFontTx/>
+              <a:buNone/>
+              <a:tabLst/>
+              <a:defRPr/>
+            </a:pPr>
+            <a:endParaRPr lang="en-GB" dirty="0"/>
+          </a:p>
+        </p:txBody>
+      </p:sp>
+      <p:sp>
+        <p:nvSpPr>
+          <p:cNvPr id="4" name="Slide Number Placeholder 3"/>
+          <p:cNvSpPr>
+            <a:spLocks noGrp="1"/>
+          </p:cNvSpPr>
+          <p:nvPr>
+            <p:ph type="sldNum" sz="quarter" idx="5"/>
+          </p:nvPr>
+        </p:nvSpPr>
+        <p:spPr/>
+        <p:txBody>
+          <a:bodyPr/>
+          <a:lstStyle/>
+          <a:p>
+            <a:fld id="{61D11EEE-6408-426C-86EC-A45CD40E17C7}" type="slidenum">
+              <a:rPr lang="en-IN" smtClean="0"/>
+              <a:t>23</a:t>
+            </a:fld>
+            <a:endParaRPr lang="en-IN"/>
+          </a:p>
+        </p:txBody>
+      </p:sp>
+    </p:spTree>
+    <p:extLst>
+      <p:ext uri="{BB962C8B-B14F-4D97-AF65-F5344CB8AC3E}">
+        <p14:creationId xmlns:p14="http://schemas.microsoft.com/office/powerpoint/2010/main" val="2019999900"/>
       </p:ext>
     </p:extLst>
   </p:cSld>
@@ -10325,7 +10076,7 @@
           <a:p>
             <a:fld id="{7FEB833B-13B3-4FA0-BE9A-3E1DCDBB796D}" type="datetimeFigureOut">
               <a:rPr lang="en-IN" smtClean="0"/>
-              <a:t>31-05-2021</a:t>
+              <a:t>05-06-2021</a:t>
             </a:fld>
             <a:endParaRPr lang="en-IN"/>
           </a:p>
@@ -10532,7 +10283,7 @@
           <a:p>
             <a:fld id="{7FEB833B-13B3-4FA0-BE9A-3E1DCDBB796D}" type="datetimeFigureOut">
               <a:rPr lang="en-IN" smtClean="0"/>
-              <a:t>31-05-2021</a:t>
+              <a:t>05-06-2021</a:t>
             </a:fld>
             <a:endParaRPr lang="en-IN"/>
           </a:p>
@@ -10712,7 +10463,7 @@
           <a:p>
             <a:fld id="{7FEB833B-13B3-4FA0-BE9A-3E1DCDBB796D}" type="datetimeFigureOut">
               <a:rPr lang="en-IN" smtClean="0"/>
-              <a:t>31-05-2021</a:t>
+              <a:t>05-06-2021</a:t>
             </a:fld>
             <a:endParaRPr lang="en-IN"/>
           </a:p>
@@ -10917,7 +10668,7 @@
           <a:p>
             <a:fld id="{7FEB833B-13B3-4FA0-BE9A-3E1DCDBB796D}" type="datetimeFigureOut">
               <a:rPr lang="en-IN" smtClean="0"/>
-              <a:t>31-05-2021</a:t>
+              <a:t>05-06-2021</a:t>
             </a:fld>
             <a:endParaRPr lang="en-IN"/>
           </a:p>
@@ -19815,7 +19566,7 @@
           <a:p>
             <a:fld id="{7FEB833B-13B3-4FA0-BE9A-3E1DCDBB796D}" type="datetimeFigureOut">
               <a:rPr lang="en-IN" smtClean="0"/>
-              <a:t>31-05-2021</a:t>
+              <a:t>05-06-2021</a:t>
             </a:fld>
             <a:endParaRPr lang="en-IN"/>
           </a:p>
@@ -20089,7 +19840,7 @@
           <a:p>
             <a:fld id="{7FEB833B-13B3-4FA0-BE9A-3E1DCDBB796D}" type="datetimeFigureOut">
               <a:rPr lang="en-IN" smtClean="0"/>
-              <a:t>31-05-2021</a:t>
+              <a:t>05-06-2021</a:t>
             </a:fld>
             <a:endParaRPr lang="en-IN"/>
           </a:p>
@@ -20487,7 +20238,7 @@
           <a:p>
             <a:fld id="{7FEB833B-13B3-4FA0-BE9A-3E1DCDBB796D}" type="datetimeFigureOut">
               <a:rPr lang="en-IN" smtClean="0"/>
-              <a:t>31-05-2021</a:t>
+              <a:t>05-06-2021</a:t>
             </a:fld>
             <a:endParaRPr lang="en-IN"/>
           </a:p>
@@ -20605,7 +20356,7 @@
           <a:p>
             <a:fld id="{7FEB833B-13B3-4FA0-BE9A-3E1DCDBB796D}" type="datetimeFigureOut">
               <a:rPr lang="en-IN" smtClean="0"/>
-              <a:t>31-05-2021</a:t>
+              <a:t>05-06-2021</a:t>
             </a:fld>
             <a:endParaRPr lang="en-IN"/>
           </a:p>
@@ -20700,7 +20451,7 @@
           <a:p>
             <a:fld id="{7FEB833B-13B3-4FA0-BE9A-3E1DCDBB796D}" type="datetimeFigureOut">
               <a:rPr lang="en-IN" smtClean="0"/>
-              <a:t>31-05-2021</a:t>
+              <a:t>05-06-2021</a:t>
             </a:fld>
             <a:endParaRPr lang="en-IN"/>
           </a:p>
@@ -20990,7 +20741,7 @@
           <a:p>
             <a:fld id="{7FEB833B-13B3-4FA0-BE9A-3E1DCDBB796D}" type="datetimeFigureOut">
               <a:rPr lang="en-IN" smtClean="0"/>
-              <a:t>31-05-2021</a:t>
+              <a:t>05-06-2021</a:t>
             </a:fld>
             <a:endParaRPr lang="en-IN"/>
           </a:p>
@@ -21270,7 +21021,7 @@
           <a:p>
             <a:fld id="{7FEB833B-13B3-4FA0-BE9A-3E1DCDBB796D}" type="datetimeFigureOut">
               <a:rPr lang="en-IN" smtClean="0"/>
-              <a:t>31-05-2021</a:t>
+              <a:t>05-06-2021</a:t>
             </a:fld>
             <a:endParaRPr lang="en-IN"/>
           </a:p>
@@ -21520,7 +21271,7 @@
           <a:p>
             <a:fld id="{7FEB833B-13B3-4FA0-BE9A-3E1DCDBB796D}" type="datetimeFigureOut">
               <a:rPr lang="en-IN" smtClean="0"/>
-              <a:t>31-05-2021</a:t>
+              <a:t>05-06-2021</a:t>
             </a:fld>
             <a:endParaRPr lang="en-IN"/>
           </a:p>
@@ -22118,6 +21869,904 @@
           <p:cNvPr id="2" name="Title 1">
             <a:extLst>
               <a:ext uri="{FF2B5EF4-FFF2-40B4-BE49-F238E27FC236}">
+                <a16:creationId xmlns:a16="http://schemas.microsoft.com/office/drawing/2014/main" id="{A306D20B-C306-4240-A2BB-312A9CDD389F}"/>
+              </a:ext>
+            </a:extLst>
+          </p:cNvPr>
+          <p:cNvSpPr>
+            <a:spLocks noGrp="1"/>
+          </p:cNvSpPr>
+          <p:nvPr>
+            <p:ph type="title"/>
+          </p:nvPr>
+        </p:nvSpPr>
+        <p:spPr/>
+        <p:txBody>
+          <a:bodyPr/>
+          <a:lstStyle/>
+          <a:p>
+            <a:r>
+              <a:rPr lang="en-IN" dirty="0"/>
+              <a:t>OLTP vs OLAP</a:t>
+            </a:r>
+          </a:p>
+        </p:txBody>
+      </p:sp>
+      <p:sp>
+        <p:nvSpPr>
+          <p:cNvPr id="3" name="Text Placeholder 2">
+            <a:extLst>
+              <a:ext uri="{FF2B5EF4-FFF2-40B4-BE49-F238E27FC236}">
+                <a16:creationId xmlns:a16="http://schemas.microsoft.com/office/drawing/2014/main" id="{84F2DBEB-35AA-4923-BCBE-6220BAD3D549}"/>
+              </a:ext>
+            </a:extLst>
+          </p:cNvPr>
+          <p:cNvSpPr>
+            <a:spLocks noGrp="1"/>
+          </p:cNvSpPr>
+          <p:nvPr>
+            <p:ph type="body" idx="1"/>
+          </p:nvPr>
+        </p:nvSpPr>
+        <p:spPr/>
+        <p:txBody>
+          <a:bodyPr/>
+          <a:lstStyle/>
+          <a:p>
+            <a:endParaRPr lang="en-IN"/>
+          </a:p>
+        </p:txBody>
+      </p:sp>
+    </p:spTree>
+    <p:extLst>
+      <p:ext uri="{BB962C8B-B14F-4D97-AF65-F5344CB8AC3E}">
+        <p14:creationId xmlns:p14="http://schemas.microsoft.com/office/powerpoint/2010/main" val="1640638788"/>
+      </p:ext>
+    </p:extLst>
+  </p:cSld>
+  <p:clrMapOvr>
+    <a:masterClrMapping/>
+  </p:clrMapOvr>
+</p:sld>
+</file>
+
+<file path=ppt/slides/slide11.xml><?xml version="1.0" encoding="utf-8"?>
+<p:sld xmlns:a="http://schemas.openxmlformats.org/drawingml/2006/main" xmlns:r="http://schemas.openxmlformats.org/officeDocument/2006/relationships" xmlns:p="http://schemas.openxmlformats.org/presentationml/2006/main">
+  <p:cSld>
+    <p:spTree>
+      <p:nvGrpSpPr>
+        <p:cNvPr id="1" name=""/>
+        <p:cNvGrpSpPr/>
+        <p:nvPr/>
+      </p:nvGrpSpPr>
+      <p:grpSpPr>
+        <a:xfrm>
+          <a:off x="0" y="0"/>
+          <a:ext cx="0" cy="0"/>
+          <a:chOff x="0" y="0"/>
+          <a:chExt cx="0" cy="0"/>
+        </a:xfrm>
+      </p:grpSpPr>
+      <p:sp>
+        <p:nvSpPr>
+          <p:cNvPr id="2" name="Title 1">
+            <a:extLst>
+              <a:ext uri="{FF2B5EF4-FFF2-40B4-BE49-F238E27FC236}">
+                <a16:creationId xmlns:a16="http://schemas.microsoft.com/office/drawing/2014/main" id="{125F7CFF-EA49-4651-8B0E-5E56EF5FBFBD}"/>
+              </a:ext>
+            </a:extLst>
+          </p:cNvPr>
+          <p:cNvSpPr>
+            <a:spLocks noGrp="1"/>
+          </p:cNvSpPr>
+          <p:nvPr>
+            <p:ph type="title"/>
+          </p:nvPr>
+        </p:nvSpPr>
+        <p:spPr/>
+        <p:txBody>
+          <a:bodyPr>
+            <a:normAutofit/>
+          </a:bodyPr>
+          <a:lstStyle/>
+          <a:p>
+            <a:r>
+              <a:rPr lang="en-GB" dirty="0"/>
+              <a:t>analytics </a:t>
+            </a:r>
+            <a:r>
+              <a:rPr lang="en-GB" dirty="0" err="1"/>
+              <a:t>db</a:t>
+            </a:r>
+            <a:r>
+              <a:rPr lang="en-GB" dirty="0"/>
+              <a:t> &amp; transaction </a:t>
+            </a:r>
+            <a:r>
+              <a:rPr lang="en-GB" dirty="0" err="1"/>
+              <a:t>db</a:t>
+            </a:r>
+            <a:endParaRPr lang="en-IN" dirty="0"/>
+          </a:p>
+        </p:txBody>
+      </p:sp>
+      <p:graphicFrame>
+        <p:nvGraphicFramePr>
+          <p:cNvPr id="18" name="Table 18">
+            <a:extLst>
+              <a:ext uri="{FF2B5EF4-FFF2-40B4-BE49-F238E27FC236}">
+                <a16:creationId xmlns:a16="http://schemas.microsoft.com/office/drawing/2014/main" id="{DD4F1775-B5F3-4ABC-908D-9C3A931CD2F7}"/>
+              </a:ext>
+            </a:extLst>
+          </p:cNvPr>
+          <p:cNvGraphicFramePr>
+            <a:graphicFrameLocks noGrp="1"/>
+          </p:cNvGraphicFramePr>
+          <p:nvPr>
+            <p:ph idx="1"/>
+            <p:extLst>
+              <p:ext uri="{D42A27DB-BD31-4B8C-83A1-F6EECF244321}">
+                <p14:modId xmlns:p14="http://schemas.microsoft.com/office/powerpoint/2010/main" val="229822955"/>
+              </p:ext>
+            </p:extLst>
+          </p:nvPr>
+        </p:nvGraphicFramePr>
+        <p:xfrm>
+          <a:off x="1023938" y="2286000"/>
+          <a:ext cx="9720073" cy="3986783"/>
+        </p:xfrm>
+        <a:graphic>
+          <a:graphicData uri="http://schemas.openxmlformats.org/drawingml/2006/table">
+            <a:tbl>
+              <a:tblPr firstRow="1" bandRow="1">
+                <a:tableStyleId>{5C22544A-7EE6-4342-B048-85BDC9FD1C3A}</a:tableStyleId>
+              </a:tblPr>
+              <a:tblGrid>
+                <a:gridCol w="1707506">
+                  <a:extLst>
+                    <a:ext uri="{9D8B030D-6E8A-4147-A177-3AD203B41FA5}">
+                      <a16:colId xmlns:a16="http://schemas.microsoft.com/office/drawing/2014/main" val="2809646805"/>
+                    </a:ext>
+                  </a:extLst>
+                </a:gridCol>
+                <a:gridCol w="3751313">
+                  <a:extLst>
+                    <a:ext uri="{9D8B030D-6E8A-4147-A177-3AD203B41FA5}">
+                      <a16:colId xmlns:a16="http://schemas.microsoft.com/office/drawing/2014/main" val="2091994275"/>
+                    </a:ext>
+                  </a:extLst>
+                </a:gridCol>
+                <a:gridCol w="4261254">
+                  <a:extLst>
+                    <a:ext uri="{9D8B030D-6E8A-4147-A177-3AD203B41FA5}">
+                      <a16:colId xmlns:a16="http://schemas.microsoft.com/office/drawing/2014/main" val="271080400"/>
+                    </a:ext>
+                  </a:extLst>
+                </a:gridCol>
+              </a:tblGrid>
+              <a:tr h="460498">
+                <a:tc>
+                  <a:txBody>
+                    <a:bodyPr/>
+                    <a:lstStyle/>
+                    <a:p>
+                      <a:r>
+                        <a:rPr lang="en-IN" dirty="0"/>
+                        <a:t>Characteristic</a:t>
+                      </a:r>
+                    </a:p>
+                  </a:txBody>
+                  <a:tcPr/>
+                </a:tc>
+                <a:tc>
+                  <a:txBody>
+                    <a:bodyPr/>
+                    <a:lstStyle/>
+                    <a:p>
+                      <a:r>
+                        <a:rPr lang="en-IN" dirty="0"/>
+                        <a:t>OLAP</a:t>
+                      </a:r>
+                    </a:p>
+                  </a:txBody>
+                  <a:tcPr/>
+                </a:tc>
+                <a:tc>
+                  <a:txBody>
+                    <a:bodyPr/>
+                    <a:lstStyle/>
+                    <a:p>
+                      <a:r>
+                        <a:rPr lang="en-IN" dirty="0"/>
+                        <a:t>OLTP</a:t>
+                      </a:r>
+                    </a:p>
+                  </a:txBody>
+                  <a:tcPr/>
+                </a:tc>
+                <a:extLst>
+                  <a:ext uri="{0D108BD9-81ED-4DB2-BD59-A6C34878D82A}">
+                    <a16:rowId xmlns:a16="http://schemas.microsoft.com/office/drawing/2014/main" val="3176116896"/>
+                  </a:ext>
+                </a:extLst>
+              </a:tr>
+              <a:tr h="1135477">
+                <a:tc>
+                  <a:txBody>
+                    <a:bodyPr/>
+                    <a:lstStyle/>
+                    <a:p>
+                      <a:r>
+                        <a:rPr lang="en-IN" sz="1800" b="0" i="0" u="none" strike="noStrike" kern="1200" dirty="0">
+                          <a:solidFill>
+                            <a:schemeClr val="dk1"/>
+                          </a:solidFill>
+                          <a:effectLst/>
+                          <a:latin typeface="+mn-lt"/>
+                          <a:ea typeface="+mn-ea"/>
+                          <a:cs typeface="+mn-cs"/>
+                        </a:rPr>
+                        <a:t>Data</a:t>
+                      </a:r>
+                      <a:endParaRPr lang="en-IN" dirty="0"/>
+                    </a:p>
+                  </a:txBody>
+                  <a:tcPr/>
+                </a:tc>
+                <a:tc>
+                  <a:txBody>
+                    <a:bodyPr/>
+                    <a:lstStyle/>
+                    <a:p>
+                      <a:pPr rtl="0"/>
+                      <a:r>
+                        <a:rPr lang="en-GB" sz="1800" b="0" i="0" u="none" strike="noStrike" kern="1200" dirty="0">
+                          <a:solidFill>
+                            <a:schemeClr val="dk1"/>
+                          </a:solidFill>
+                          <a:effectLst/>
+                          <a:latin typeface="+mn-lt"/>
+                          <a:ea typeface="+mn-ea"/>
+                          <a:cs typeface="+mn-cs"/>
+                        </a:rPr>
+                        <a:t>Historical data in column format.</a:t>
+                      </a:r>
+                      <a:endParaRPr lang="en-GB" b="0" dirty="0">
+                        <a:effectLst/>
+                      </a:endParaRPr>
+                    </a:p>
+                    <a:p>
+                      <a:pPr rtl="0"/>
+                      <a:br>
+                        <a:rPr lang="en-GB" sz="1800" b="0" i="0" u="none" strike="noStrike" kern="1200" dirty="0">
+                          <a:solidFill>
+                            <a:schemeClr val="dk1"/>
+                          </a:solidFill>
+                          <a:effectLst/>
+                          <a:latin typeface="+mn-lt"/>
+                          <a:ea typeface="+mn-ea"/>
+                          <a:cs typeface="+mn-cs"/>
+                        </a:rPr>
+                      </a:br>
+                      <a:r>
+                        <a:rPr lang="en-GB" sz="1800" b="0" i="0" u="none" strike="noStrike" kern="1200" dirty="0">
+                          <a:solidFill>
+                            <a:schemeClr val="dk1"/>
+                          </a:solidFill>
+                          <a:effectLst/>
+                          <a:latin typeface="+mn-lt"/>
+                          <a:ea typeface="+mn-ea"/>
+                          <a:cs typeface="+mn-cs"/>
+                        </a:rPr>
+                        <a:t>Read more and rare writes.</a:t>
+                      </a:r>
+                      <a:endParaRPr lang="en-GB" b="0" dirty="0">
+                        <a:effectLst/>
+                      </a:endParaRPr>
+                    </a:p>
+                  </a:txBody>
+                  <a:tcPr/>
+                </a:tc>
+                <a:tc>
+                  <a:txBody>
+                    <a:bodyPr/>
+                    <a:lstStyle/>
+                    <a:p>
+                      <a:pPr rtl="0"/>
+                      <a:r>
+                        <a:rPr lang="en-GB" sz="1800" b="0" i="0" u="none" strike="noStrike" kern="1200" dirty="0">
+                          <a:solidFill>
+                            <a:schemeClr val="dk1"/>
+                          </a:solidFill>
+                          <a:effectLst/>
+                          <a:latin typeface="+mn-lt"/>
+                          <a:ea typeface="+mn-ea"/>
+                          <a:cs typeface="+mn-cs"/>
+                        </a:rPr>
+                        <a:t>Operational data in row format.</a:t>
+                      </a:r>
+                      <a:endParaRPr lang="en-GB" b="0" dirty="0">
+                        <a:effectLst/>
+                      </a:endParaRPr>
+                    </a:p>
+                    <a:p>
+                      <a:pPr rtl="0"/>
+                      <a:br>
+                        <a:rPr lang="en-GB" sz="1800" b="0" i="0" u="none" strike="noStrike" kern="1200" dirty="0">
+                          <a:solidFill>
+                            <a:schemeClr val="dk1"/>
+                          </a:solidFill>
+                          <a:effectLst/>
+                          <a:latin typeface="+mn-lt"/>
+                          <a:ea typeface="+mn-ea"/>
+                          <a:cs typeface="+mn-cs"/>
+                        </a:rPr>
+                      </a:br>
+                      <a:r>
+                        <a:rPr lang="en-GB" sz="1800" b="0" i="0" u="none" strike="noStrike" kern="1200" dirty="0">
+                          <a:solidFill>
+                            <a:schemeClr val="dk1"/>
+                          </a:solidFill>
+                          <a:effectLst/>
+                          <a:latin typeface="+mn-lt"/>
+                          <a:ea typeface="+mn-ea"/>
+                          <a:cs typeface="+mn-cs"/>
+                        </a:rPr>
+                        <a:t>Both read and write</a:t>
+                      </a:r>
+                      <a:r>
+                        <a:rPr lang="en-IN" sz="1800" b="0" i="0" u="none" strike="noStrike" kern="1200" dirty="0">
+                          <a:solidFill>
+                            <a:schemeClr val="dk1"/>
+                          </a:solidFill>
+                          <a:effectLst/>
+                          <a:latin typeface="+mn-lt"/>
+                          <a:ea typeface="+mn-ea"/>
+                          <a:cs typeface="+mn-cs"/>
+                        </a:rPr>
+                        <a:t>.</a:t>
+                      </a:r>
+                      <a:endParaRPr lang="en-GB" b="0" dirty="0">
+                        <a:effectLst/>
+                      </a:endParaRPr>
+                    </a:p>
+                  </a:txBody>
+                  <a:tcPr/>
+                </a:tc>
+                <a:extLst>
+                  <a:ext uri="{0D108BD9-81ED-4DB2-BD59-A6C34878D82A}">
+                    <a16:rowId xmlns:a16="http://schemas.microsoft.com/office/drawing/2014/main" val="2560369307"/>
+                  </a:ext>
+                </a:extLst>
+              </a:tr>
+              <a:tr h="1135477">
+                <a:tc>
+                  <a:txBody>
+                    <a:bodyPr/>
+                    <a:lstStyle/>
+                    <a:p>
+                      <a:r>
+                        <a:rPr lang="en-IN" sz="1800" b="0" i="0" u="none" strike="noStrike" kern="1200" dirty="0">
+                          <a:solidFill>
+                            <a:schemeClr val="dk1"/>
+                          </a:solidFill>
+                          <a:effectLst/>
+                          <a:latin typeface="+mn-lt"/>
+                          <a:ea typeface="+mn-ea"/>
+                          <a:cs typeface="+mn-cs"/>
+                        </a:rPr>
+                        <a:t>Query pattern</a:t>
+                      </a:r>
+                      <a:endParaRPr lang="en-IN" dirty="0"/>
+                    </a:p>
+                  </a:txBody>
+                  <a:tcPr/>
+                </a:tc>
+                <a:tc>
+                  <a:txBody>
+                    <a:bodyPr/>
+                    <a:lstStyle/>
+                    <a:p>
+                      <a:pPr rtl="0"/>
+                      <a:r>
+                        <a:rPr lang="en-GB" sz="1800" b="0" i="0" u="none" strike="noStrike" kern="1200" dirty="0">
+                          <a:solidFill>
+                            <a:schemeClr val="dk1"/>
+                          </a:solidFill>
+                          <a:effectLst/>
+                          <a:latin typeface="+mn-lt"/>
+                          <a:ea typeface="+mn-ea"/>
+                          <a:cs typeface="+mn-cs"/>
+                        </a:rPr>
+                        <a:t>Large no of records included with aggregations, complex joins, filter, drill down, slice, dice.</a:t>
+                      </a:r>
+                      <a:endParaRPr lang="en-GB" b="0" dirty="0">
+                        <a:effectLst/>
+                      </a:endParaRPr>
+                    </a:p>
+                  </a:txBody>
+                  <a:tcPr/>
+                </a:tc>
+                <a:tc>
+                  <a:txBody>
+                    <a:bodyPr/>
+                    <a:lstStyle/>
+                    <a:p>
+                      <a:pPr rtl="0"/>
+                      <a:r>
+                        <a:rPr lang="en-GB" sz="1800" b="0" i="0" u="none" strike="noStrike" kern="1200" dirty="0">
+                          <a:solidFill>
+                            <a:schemeClr val="dk1"/>
+                          </a:solidFill>
+                          <a:effectLst/>
+                          <a:latin typeface="+mn-lt"/>
+                          <a:ea typeface="+mn-ea"/>
+                          <a:cs typeface="+mn-cs"/>
+                        </a:rPr>
+                        <a:t>Small no of records fetched by key, mostly simple joins, CRUD.</a:t>
+                      </a:r>
+                      <a:endParaRPr lang="en-GB" b="0" dirty="0">
+                        <a:effectLst/>
+                      </a:endParaRPr>
+                    </a:p>
+                  </a:txBody>
+                  <a:tcPr/>
+                </a:tc>
+                <a:extLst>
+                  <a:ext uri="{0D108BD9-81ED-4DB2-BD59-A6C34878D82A}">
+                    <a16:rowId xmlns:a16="http://schemas.microsoft.com/office/drawing/2014/main" val="2476863215"/>
+                  </a:ext>
+                </a:extLst>
+              </a:tr>
+              <a:tr h="460498">
+                <a:tc>
+                  <a:txBody>
+                    <a:bodyPr/>
+                    <a:lstStyle/>
+                    <a:p>
+                      <a:r>
+                        <a:rPr lang="en-IN" sz="1800" b="0" i="0" u="none" strike="noStrike" kern="1200" dirty="0">
+                          <a:solidFill>
+                            <a:schemeClr val="dk1"/>
+                          </a:solidFill>
+                          <a:effectLst/>
+                          <a:latin typeface="+mn-lt"/>
+                          <a:ea typeface="+mn-ea"/>
+                          <a:cs typeface="+mn-cs"/>
+                        </a:rPr>
+                        <a:t>Users</a:t>
+                      </a:r>
+                      <a:endParaRPr lang="en-IN" dirty="0"/>
+                    </a:p>
+                  </a:txBody>
+                  <a:tcPr/>
+                </a:tc>
+                <a:tc>
+                  <a:txBody>
+                    <a:bodyPr/>
+                    <a:lstStyle/>
+                    <a:p>
+                      <a:r>
+                        <a:rPr lang="en-IN" sz="1800" b="0" i="0" u="none" strike="noStrike" kern="1200" dirty="0">
+                          <a:solidFill>
+                            <a:schemeClr val="dk1"/>
+                          </a:solidFill>
+                          <a:effectLst/>
+                          <a:latin typeface="+mn-lt"/>
+                          <a:ea typeface="+mn-ea"/>
+                          <a:cs typeface="+mn-cs"/>
+                        </a:rPr>
+                        <a:t>Analyst, decision makers.</a:t>
+                      </a:r>
+                      <a:endParaRPr lang="en-IN" dirty="0"/>
+                    </a:p>
+                  </a:txBody>
+                  <a:tcPr/>
+                </a:tc>
+                <a:tc>
+                  <a:txBody>
+                    <a:bodyPr/>
+                    <a:lstStyle/>
+                    <a:p>
+                      <a:r>
+                        <a:rPr lang="en-IN" sz="1800" b="0" i="0" u="none" strike="noStrike" kern="1200" dirty="0">
+                          <a:solidFill>
+                            <a:schemeClr val="dk1"/>
+                          </a:solidFill>
+                          <a:effectLst/>
+                          <a:latin typeface="+mn-lt"/>
+                          <a:ea typeface="+mn-ea"/>
+                          <a:cs typeface="+mn-cs"/>
+                        </a:rPr>
+                        <a:t>Application builders, Backend developers.</a:t>
+                      </a:r>
+                      <a:endParaRPr lang="en-IN" dirty="0"/>
+                    </a:p>
+                  </a:txBody>
+                  <a:tcPr/>
+                </a:tc>
+                <a:extLst>
+                  <a:ext uri="{0D108BD9-81ED-4DB2-BD59-A6C34878D82A}">
+                    <a16:rowId xmlns:a16="http://schemas.microsoft.com/office/drawing/2014/main" val="120378812"/>
+                  </a:ext>
+                </a:extLst>
+              </a:tr>
+              <a:tr h="794833">
+                <a:tc>
+                  <a:txBody>
+                    <a:bodyPr/>
+                    <a:lstStyle/>
+                    <a:p>
+                      <a:r>
+                        <a:rPr lang="en-IN" sz="1800" b="0" i="0" u="none" strike="noStrike" kern="1200" dirty="0">
+                          <a:solidFill>
+                            <a:schemeClr val="dk1"/>
+                          </a:solidFill>
+                          <a:effectLst/>
+                          <a:latin typeface="+mn-lt"/>
+                          <a:ea typeface="+mn-ea"/>
+                          <a:cs typeface="+mn-cs"/>
+                        </a:rPr>
+                        <a:t>Providers</a:t>
+                      </a:r>
+                      <a:endParaRPr lang="en-IN" dirty="0"/>
+                    </a:p>
+                  </a:txBody>
+                  <a:tcPr/>
+                </a:tc>
+                <a:tc>
+                  <a:txBody>
+                    <a:bodyPr/>
+                    <a:lstStyle/>
+                    <a:p>
+                      <a:r>
+                        <a:rPr lang="en-GB" sz="1800" b="0" i="0" u="none" strike="noStrike" kern="1200" dirty="0">
+                          <a:solidFill>
+                            <a:schemeClr val="dk1"/>
+                          </a:solidFill>
+                          <a:effectLst/>
+                          <a:latin typeface="+mn-lt"/>
+                          <a:ea typeface="+mn-ea"/>
+                          <a:cs typeface="+mn-cs"/>
+                        </a:rPr>
+                        <a:t>Snowflake, Big Query, Redshift, Teradata vantage.</a:t>
+                      </a:r>
+                      <a:endParaRPr lang="en-IN" dirty="0"/>
+                    </a:p>
+                  </a:txBody>
+                  <a:tcPr/>
+                </a:tc>
+                <a:tc>
+                  <a:txBody>
+                    <a:bodyPr/>
+                    <a:lstStyle/>
+                    <a:p>
+                      <a:r>
+                        <a:rPr lang="en-IN" sz="1800" b="0" i="0" u="none" strike="noStrike" kern="1200" dirty="0">
+                          <a:solidFill>
+                            <a:schemeClr val="dk1"/>
+                          </a:solidFill>
+                          <a:effectLst/>
+                          <a:latin typeface="+mn-lt"/>
+                          <a:ea typeface="+mn-ea"/>
+                          <a:cs typeface="+mn-cs"/>
+                        </a:rPr>
+                        <a:t>SQL Server, </a:t>
+                      </a:r>
+                      <a:r>
+                        <a:rPr lang="en-IN" sz="1800" b="0" i="0" u="none" strike="noStrike" kern="1200" dirty="0" err="1">
+                          <a:solidFill>
+                            <a:schemeClr val="dk1"/>
+                          </a:solidFill>
+                          <a:effectLst/>
+                          <a:latin typeface="+mn-lt"/>
+                          <a:ea typeface="+mn-ea"/>
+                          <a:cs typeface="+mn-cs"/>
+                        </a:rPr>
+                        <a:t>Mysql</a:t>
+                      </a:r>
+                      <a:r>
+                        <a:rPr lang="en-IN" sz="1800" b="0" i="0" u="none" strike="noStrike" kern="1200" dirty="0">
+                          <a:solidFill>
+                            <a:schemeClr val="dk1"/>
+                          </a:solidFill>
+                          <a:effectLst/>
+                          <a:latin typeface="+mn-lt"/>
+                          <a:ea typeface="+mn-ea"/>
+                          <a:cs typeface="+mn-cs"/>
+                        </a:rPr>
+                        <a:t>, Postgres, Azure Cloud SQL, Google Cloud Spanner, AWS RDS.</a:t>
+                      </a:r>
+                      <a:endParaRPr lang="en-IN" dirty="0"/>
+                    </a:p>
+                  </a:txBody>
+                  <a:tcPr/>
+                </a:tc>
+                <a:extLst>
+                  <a:ext uri="{0D108BD9-81ED-4DB2-BD59-A6C34878D82A}">
+                    <a16:rowId xmlns:a16="http://schemas.microsoft.com/office/drawing/2014/main" val="3189957509"/>
+                  </a:ext>
+                </a:extLst>
+              </a:tr>
+            </a:tbl>
+          </a:graphicData>
+        </a:graphic>
+      </p:graphicFrame>
+    </p:spTree>
+    <p:extLst>
+      <p:ext uri="{BB962C8B-B14F-4D97-AF65-F5344CB8AC3E}">
+        <p14:creationId xmlns:p14="http://schemas.microsoft.com/office/powerpoint/2010/main" val="2143496613"/>
+      </p:ext>
+    </p:extLst>
+  </p:cSld>
+  <p:clrMapOvr>
+    <a:masterClrMapping/>
+  </p:clrMapOvr>
+</p:sld>
+</file>
+
+<file path=ppt/slides/slide12.xml><?xml version="1.0" encoding="utf-8"?>
+<p:sld xmlns:a="http://schemas.openxmlformats.org/drawingml/2006/main" xmlns:r="http://schemas.openxmlformats.org/officeDocument/2006/relationships" xmlns:p="http://schemas.openxmlformats.org/presentationml/2006/main">
+  <p:cSld>
+    <p:spTree>
+      <p:nvGrpSpPr>
+        <p:cNvPr id="1" name=""/>
+        <p:cNvGrpSpPr/>
+        <p:nvPr/>
+      </p:nvGrpSpPr>
+      <p:grpSpPr>
+        <a:xfrm>
+          <a:off x="0" y="0"/>
+          <a:ext cx="0" cy="0"/>
+          <a:chOff x="0" y="0"/>
+          <a:chExt cx="0" cy="0"/>
+        </a:xfrm>
+      </p:grpSpPr>
+      <p:sp>
+        <p:nvSpPr>
+          <p:cNvPr id="2" name="Title 1">
+            <a:extLst>
+              <a:ext uri="{FF2B5EF4-FFF2-40B4-BE49-F238E27FC236}">
+                <a16:creationId xmlns:a16="http://schemas.microsoft.com/office/drawing/2014/main" id="{0972A356-0FD7-45BD-AD94-3E15E5CB6A72}"/>
+              </a:ext>
+            </a:extLst>
+          </p:cNvPr>
+          <p:cNvSpPr>
+            <a:spLocks noGrp="1"/>
+          </p:cNvSpPr>
+          <p:nvPr>
+            <p:ph type="title"/>
+          </p:nvPr>
+        </p:nvSpPr>
+        <p:spPr/>
+        <p:txBody>
+          <a:bodyPr/>
+          <a:lstStyle/>
+          <a:p>
+            <a:r>
+              <a:rPr lang="en-IN" dirty="0"/>
+              <a:t>Hybrid data architecture</a:t>
+            </a:r>
+          </a:p>
+        </p:txBody>
+      </p:sp>
+      <p:pic>
+        <p:nvPicPr>
+          <p:cNvPr id="4" name="Content Placeholder 3">
+            <a:extLst>
+              <a:ext uri="{FF2B5EF4-FFF2-40B4-BE49-F238E27FC236}">
+                <a16:creationId xmlns:a16="http://schemas.microsoft.com/office/drawing/2014/main" id="{00C5116F-C81B-44D1-9E06-036FC65CF446}"/>
+              </a:ext>
+            </a:extLst>
+          </p:cNvPr>
+          <p:cNvPicPr>
+            <a:picLocks noGrp="1" noChangeAspect="1"/>
+          </p:cNvPicPr>
+          <p:nvPr>
+            <p:ph idx="1"/>
+          </p:nvPr>
+        </p:nvPicPr>
+        <p:blipFill rotWithShape="1">
+          <a:blip r:embed="rId2"/>
+          <a:srcRect t="24305"/>
+          <a:stretch/>
+        </p:blipFill>
+        <p:spPr>
+          <a:xfrm>
+            <a:off x="1160170" y="2286000"/>
+            <a:ext cx="9447798" cy="4022725"/>
+          </a:xfrm>
+          <a:prstGeom prst="rect">
+            <a:avLst/>
+          </a:prstGeom>
+          <a:ln>
+            <a:solidFill>
+              <a:schemeClr val="accent1"/>
+            </a:solidFill>
+          </a:ln>
+        </p:spPr>
+      </p:pic>
+    </p:spTree>
+    <p:extLst>
+      <p:ext uri="{BB962C8B-B14F-4D97-AF65-F5344CB8AC3E}">
+        <p14:creationId xmlns:p14="http://schemas.microsoft.com/office/powerpoint/2010/main" val="2347875384"/>
+      </p:ext>
+    </p:extLst>
+  </p:cSld>
+  <p:clrMapOvr>
+    <a:masterClrMapping/>
+  </p:clrMapOvr>
+</p:sld>
+</file>
+
+<file path=ppt/slides/slide13.xml><?xml version="1.0" encoding="utf-8"?>
+<p:sld xmlns:a="http://schemas.openxmlformats.org/drawingml/2006/main" xmlns:r="http://schemas.openxmlformats.org/officeDocument/2006/relationships" xmlns:p="http://schemas.openxmlformats.org/presentationml/2006/main">
+  <p:cSld>
+    <p:spTree>
+      <p:nvGrpSpPr>
+        <p:cNvPr id="1" name=""/>
+        <p:cNvGrpSpPr/>
+        <p:nvPr/>
+      </p:nvGrpSpPr>
+      <p:grpSpPr>
+        <a:xfrm>
+          <a:off x="0" y="0"/>
+          <a:ext cx="0" cy="0"/>
+          <a:chOff x="0" y="0"/>
+          <a:chExt cx="0" cy="0"/>
+        </a:xfrm>
+      </p:grpSpPr>
+      <p:sp>
+        <p:nvSpPr>
+          <p:cNvPr id="2" name="Title 1">
+            <a:extLst>
+              <a:ext uri="{FF2B5EF4-FFF2-40B4-BE49-F238E27FC236}">
+                <a16:creationId xmlns:a16="http://schemas.microsoft.com/office/drawing/2014/main" id="{D34106F3-9E5D-4E4F-A109-BC5FE08EEE33}"/>
+              </a:ext>
+            </a:extLst>
+          </p:cNvPr>
+          <p:cNvSpPr>
+            <a:spLocks noGrp="1"/>
+          </p:cNvSpPr>
+          <p:nvPr>
+            <p:ph type="title"/>
+          </p:nvPr>
+        </p:nvSpPr>
+        <p:spPr/>
+        <p:txBody>
+          <a:bodyPr/>
+          <a:lstStyle/>
+          <a:p>
+            <a:r>
+              <a:rPr lang="en-IN" dirty="0"/>
+              <a:t>SNOWFLAKE data platform</a:t>
+            </a:r>
+          </a:p>
+        </p:txBody>
+      </p:sp>
+      <p:sp>
+        <p:nvSpPr>
+          <p:cNvPr id="3" name="Text Placeholder 2">
+            <a:extLst>
+              <a:ext uri="{FF2B5EF4-FFF2-40B4-BE49-F238E27FC236}">
+                <a16:creationId xmlns:a16="http://schemas.microsoft.com/office/drawing/2014/main" id="{01310E61-211B-4680-9EBF-E886CE3BBC73}"/>
+              </a:ext>
+            </a:extLst>
+          </p:cNvPr>
+          <p:cNvSpPr>
+            <a:spLocks noGrp="1"/>
+          </p:cNvSpPr>
+          <p:nvPr>
+            <p:ph type="body" idx="1"/>
+          </p:nvPr>
+        </p:nvSpPr>
+        <p:spPr/>
+        <p:txBody>
+          <a:bodyPr/>
+          <a:lstStyle/>
+          <a:p>
+            <a:r>
+              <a:rPr lang="en-IN" dirty="0"/>
+              <a:t>Data Warehouse as a service</a:t>
+            </a:r>
+          </a:p>
+        </p:txBody>
+      </p:sp>
+    </p:spTree>
+    <p:extLst>
+      <p:ext uri="{BB962C8B-B14F-4D97-AF65-F5344CB8AC3E}">
+        <p14:creationId xmlns:p14="http://schemas.microsoft.com/office/powerpoint/2010/main" val="2834087559"/>
+      </p:ext>
+    </p:extLst>
+  </p:cSld>
+  <p:clrMapOvr>
+    <a:masterClrMapping/>
+  </p:clrMapOvr>
+</p:sld>
+</file>
+
+<file path=ppt/slides/slide14.xml><?xml version="1.0" encoding="utf-8"?>
+<p:sld xmlns:a="http://schemas.openxmlformats.org/drawingml/2006/main" xmlns:r="http://schemas.openxmlformats.org/officeDocument/2006/relationships" xmlns:p="http://schemas.openxmlformats.org/presentationml/2006/main">
+  <p:cSld>
+    <p:spTree>
+      <p:nvGrpSpPr>
+        <p:cNvPr id="1" name=""/>
+        <p:cNvGrpSpPr/>
+        <p:nvPr/>
+      </p:nvGrpSpPr>
+      <p:grpSpPr>
+        <a:xfrm>
+          <a:off x="0" y="0"/>
+          <a:ext cx="0" cy="0"/>
+          <a:chOff x="0" y="0"/>
+          <a:chExt cx="0" cy="0"/>
+        </a:xfrm>
+      </p:grpSpPr>
+      <p:pic>
+        <p:nvPicPr>
+          <p:cNvPr id="3" name="Picture 2">
+            <a:extLst>
+              <a:ext uri="{FF2B5EF4-FFF2-40B4-BE49-F238E27FC236}">
+                <a16:creationId xmlns:a16="http://schemas.microsoft.com/office/drawing/2014/main" id="{B4D0A029-232A-4A17-B22D-6698A9D9AB4D}"/>
+              </a:ext>
+            </a:extLst>
+          </p:cNvPr>
+          <p:cNvPicPr>
+            <a:picLocks noChangeAspect="1"/>
+          </p:cNvPicPr>
+          <p:nvPr/>
+        </p:nvPicPr>
+        <p:blipFill>
+          <a:blip r:embed="rId2"/>
+          <a:stretch>
+            <a:fillRect/>
+          </a:stretch>
+        </p:blipFill>
+        <p:spPr>
+          <a:xfrm>
+            <a:off x="37254" y="37626"/>
+            <a:ext cx="12117491" cy="6782747"/>
+          </a:xfrm>
+          <a:prstGeom prst="rect">
+            <a:avLst/>
+          </a:prstGeom>
+        </p:spPr>
+      </p:pic>
+    </p:spTree>
+    <p:extLst>
+      <p:ext uri="{BB962C8B-B14F-4D97-AF65-F5344CB8AC3E}">
+        <p14:creationId xmlns:p14="http://schemas.microsoft.com/office/powerpoint/2010/main" val="1254467546"/>
+      </p:ext>
+    </p:extLst>
+  </p:cSld>
+  <p:clrMapOvr>
+    <a:masterClrMapping/>
+  </p:clrMapOvr>
+</p:sld>
+</file>
+
+<file path=ppt/slides/slide15.xml><?xml version="1.0" encoding="utf-8"?>
+<p:sld xmlns:a="http://schemas.openxmlformats.org/drawingml/2006/main" xmlns:r="http://schemas.openxmlformats.org/officeDocument/2006/relationships" xmlns:p="http://schemas.openxmlformats.org/presentationml/2006/main">
+  <p:cSld>
+    <p:spTree>
+      <p:nvGrpSpPr>
+        <p:cNvPr id="1" name=""/>
+        <p:cNvGrpSpPr/>
+        <p:nvPr/>
+      </p:nvGrpSpPr>
+      <p:grpSpPr>
+        <a:xfrm>
+          <a:off x="0" y="0"/>
+          <a:ext cx="0" cy="0"/>
+          <a:chOff x="0" y="0"/>
+          <a:chExt cx="0" cy="0"/>
+        </a:xfrm>
+      </p:grpSpPr>
+      <p:sp>
+        <p:nvSpPr>
+          <p:cNvPr id="2" name="Title 1">
+            <a:extLst>
+              <a:ext uri="{FF2B5EF4-FFF2-40B4-BE49-F238E27FC236}">
                 <a16:creationId xmlns:a16="http://schemas.microsoft.com/office/drawing/2014/main" id="{93251EF0-6070-4F18-9D02-963641BE8C5C}"/>
               </a:ext>
             </a:extLst>
@@ -22165,19 +22814,25 @@
           <a:p>
             <a:r>
               <a:rPr lang="en-GB" dirty="0"/>
-              <a:t>* Amazon Redshift</a:t>
+              <a:t>* Azure Synapse Analytics (Azure SQL Data warehouse)</a:t>
             </a:r>
           </a:p>
           <a:p>
+            <a:pPr marL="0" indent="0">
+              <a:buNone/>
+            </a:pPr>
             <a:r>
               <a:rPr lang="en-GB" dirty="0"/>
-              <a:t>* Azure SQL Data warehouse (Azure Synapse Analytics)</a:t>
+              <a:t> * Snowflake</a:t>
             </a:r>
           </a:p>
           <a:p>
+            <a:pPr marL="0" indent="0">
+              <a:buNone/>
+            </a:pPr>
             <a:r>
               <a:rPr lang="en-GB" dirty="0"/>
-              <a:t>* Snowflake</a:t>
+              <a:t> * Amazon Redshift</a:t>
             </a:r>
           </a:p>
           <a:p>
@@ -22206,87 +22861,7 @@
 </p:sld>
 </file>
 
-<file path=ppt/slides/slide11.xml><?xml version="1.0" encoding="utf-8"?>
-<p:sld xmlns:a="http://schemas.openxmlformats.org/drawingml/2006/main" xmlns:r="http://schemas.openxmlformats.org/officeDocument/2006/relationships" xmlns:p="http://schemas.openxmlformats.org/presentationml/2006/main">
-  <p:cSld>
-    <p:spTree>
-      <p:nvGrpSpPr>
-        <p:cNvPr id="1" name=""/>
-        <p:cNvGrpSpPr/>
-        <p:nvPr/>
-      </p:nvGrpSpPr>
-      <p:grpSpPr>
-        <a:xfrm>
-          <a:off x="0" y="0"/>
-          <a:ext cx="0" cy="0"/>
-          <a:chOff x="0" y="0"/>
-          <a:chExt cx="0" cy="0"/>
-        </a:xfrm>
-      </p:grpSpPr>
-      <p:sp>
-        <p:nvSpPr>
-          <p:cNvPr id="2" name="Title 1">
-            <a:extLst>
-              <a:ext uri="{FF2B5EF4-FFF2-40B4-BE49-F238E27FC236}">
-                <a16:creationId xmlns:a16="http://schemas.microsoft.com/office/drawing/2014/main" id="{680A6D91-295B-4F97-AE52-EFF8C272720D}"/>
-              </a:ext>
-            </a:extLst>
-          </p:cNvPr>
-          <p:cNvSpPr>
-            <a:spLocks noGrp="1"/>
-          </p:cNvSpPr>
-          <p:nvPr>
-            <p:ph type="title"/>
-          </p:nvPr>
-        </p:nvSpPr>
-        <p:spPr/>
-        <p:txBody>
-          <a:bodyPr/>
-          <a:lstStyle/>
-          <a:p>
-            <a:endParaRPr lang="en-IN"/>
-          </a:p>
-        </p:txBody>
-      </p:sp>
-      <p:sp>
-        <p:nvSpPr>
-          <p:cNvPr id="13" name="Content Placeholder 12">
-            <a:extLst>
-              <a:ext uri="{FF2B5EF4-FFF2-40B4-BE49-F238E27FC236}">
-                <a16:creationId xmlns:a16="http://schemas.microsoft.com/office/drawing/2014/main" id="{FCB7F367-5AA8-46B1-83F0-6B4CBEDF440F}"/>
-              </a:ext>
-            </a:extLst>
-          </p:cNvPr>
-          <p:cNvSpPr>
-            <a:spLocks noGrp="1"/>
-          </p:cNvSpPr>
-          <p:nvPr>
-            <p:ph idx="1"/>
-          </p:nvPr>
-        </p:nvSpPr>
-        <p:spPr/>
-        <p:txBody>
-          <a:bodyPr/>
-          <a:lstStyle/>
-          <a:p>
-            <a:endParaRPr lang="en-IN"/>
-          </a:p>
-        </p:txBody>
-      </p:sp>
-    </p:spTree>
-    <p:extLst>
-      <p:ext uri="{BB962C8B-B14F-4D97-AF65-F5344CB8AC3E}">
-        <p14:creationId xmlns:p14="http://schemas.microsoft.com/office/powerpoint/2010/main" val="67604697"/>
-      </p:ext>
-    </p:extLst>
-  </p:cSld>
-  <p:clrMapOvr>
-    <a:masterClrMapping/>
-  </p:clrMapOvr>
-</p:sld>
-</file>
-
-<file path=ppt/slides/slide12.xml><?xml version="1.0" encoding="utf-8"?>
+<file path=ppt/slides/slide16.xml><?xml version="1.0" encoding="utf-8"?>
 <p:sld xmlns:a="http://schemas.openxmlformats.org/drawingml/2006/main" xmlns:r="http://schemas.openxmlformats.org/officeDocument/2006/relationships" xmlns:p="http://schemas.openxmlformats.org/presentationml/2006/main">
   <p:cSld>
     <p:spTree>
@@ -22334,10 +22909,10 @@
       </p:sp>
       <p:pic>
         <p:nvPicPr>
-          <p:cNvPr id="9" name="Picture 8">
+          <p:cNvPr id="4" name="Picture 3">
             <a:extLst>
               <a:ext uri="{FF2B5EF4-FFF2-40B4-BE49-F238E27FC236}">
-                <a16:creationId xmlns:a16="http://schemas.microsoft.com/office/drawing/2014/main" id="{B4E19D9D-971B-4877-8056-80FAC850D507}"/>
+                <a16:creationId xmlns:a16="http://schemas.microsoft.com/office/drawing/2014/main" id="{3B1EB6E8-7342-45E5-B84E-4404F8B17735}"/>
               </a:ext>
             </a:extLst>
           </p:cNvPr>
@@ -22347,20 +22922,24 @@
           <p:nvPr/>
         </p:nvPicPr>
         <p:blipFill>
-          <a:blip r:embed="rId2"/>
+          <a:blip r:embed="rId3"/>
           <a:stretch>
             <a:fillRect/>
           </a:stretch>
         </p:blipFill>
         <p:spPr>
           <a:xfrm>
-            <a:off x="1828800" y="2084832"/>
-            <a:ext cx="8534400" cy="4644828"/>
+            <a:off x="1024128" y="2084832"/>
+            <a:ext cx="9986694" cy="4314252"/>
           </a:xfrm>
           <a:prstGeom prst="rect">
             <a:avLst/>
           </a:prstGeom>
-          <a:noFill/>
+          <a:ln>
+            <a:solidFill>
+              <a:schemeClr val="accent1"/>
+            </a:solidFill>
+          </a:ln>
         </p:spPr>
       </p:pic>
     </p:spTree>
@@ -22376,7 +22955,7 @@
 </p:sld>
 </file>
 
-<file path=ppt/slides/slide13.xml><?xml version="1.0" encoding="utf-8"?>
+<file path=ppt/slides/slide17.xml><?xml version="1.0" encoding="utf-8"?>
 <p:sld xmlns:a="http://schemas.openxmlformats.org/drawingml/2006/main" xmlns:r="http://schemas.openxmlformats.org/officeDocument/2006/relationships" xmlns:p="http://schemas.openxmlformats.org/presentationml/2006/main">
   <p:cSld>
     <p:spTree>
@@ -22416,7 +22995,7 @@
           <a:p>
             <a:r>
               <a:rPr lang="en-IN" dirty="0"/>
-              <a:t>Components used in demo</a:t>
+              <a:t>What makes Snowflake unique</a:t>
             </a:r>
           </a:p>
         </p:txBody>
@@ -22443,6 +23022,12 @@
           <a:lstStyle/>
           <a:p>
             <a:r>
+              <a:rPr lang="en-GB" dirty="0"/>
+              <a:t>* Auto scaling.</a:t>
+            </a:r>
+          </a:p>
+          <a:p>
+            <a:r>
               <a:rPr lang="en-IN" dirty="0"/>
               <a:t>* </a:t>
             </a:r>
@@ -22458,21 +23043,13 @@
           <a:p>
             <a:r>
               <a:rPr lang="en-GB" dirty="0"/>
-              <a:t>* Zero Copy Cloning - Prod/Dev/Test - Assign cloned </a:t>
-            </a:r>
-            <a:r>
-              <a:rPr lang="en-GB" dirty="0" err="1"/>
-              <a:t>tweets_test</a:t>
-            </a:r>
-            <a:r>
-              <a:rPr lang="en-GB" dirty="0"/>
-              <a:t> table to testing team.</a:t>
+              <a:t>* Zero Copy Cloning - Prod/Dev/Test - Assign cloned tweets table to testing team.</a:t>
             </a:r>
           </a:p>
           <a:p>
             <a:r>
               <a:rPr lang="en-GB" dirty="0"/>
-              <a:t>* Analyse semi-</a:t>
+              <a:t>* Schema on read via variant datatype. Analyse semi-</a:t>
             </a:r>
             <a:r>
               <a:rPr lang="en-GB" dirty="0" err="1"/>
@@ -22488,19 +23065,15 @@
             </a:r>
             <a:r>
               <a:rPr lang="en-GB" dirty="0"/>
-              <a:t>, parquet.</a:t>
+              <a:t>, parquet – </a:t>
             </a:r>
-          </a:p>
-          <a:p>
+            <a:r>
+              <a:rPr lang="en-GB" dirty="0" err="1"/>
+              <a:t>tweets_view</a:t>
+            </a:r>
             <a:r>
               <a:rPr lang="en-GB" dirty="0"/>
-              <a:t>* Fast auto scaling.</a:t>
-            </a:r>
-          </a:p>
-          <a:p>
-            <a:r>
-              <a:rPr lang="en-GB" dirty="0"/>
-              <a:t>* Schema on read via variant datatype.</a:t>
+              <a:t>.</a:t>
             </a:r>
           </a:p>
           <a:p>
@@ -22527,7 +23100,7 @@
 </p:sld>
 </file>
 
-<file path=ppt/slides/slide14.xml><?xml version="1.0" encoding="utf-8"?>
+<file path=ppt/slides/slide18.xml><?xml version="1.0" encoding="utf-8"?>
 <p:sld xmlns:a="http://schemas.openxmlformats.org/drawingml/2006/main" xmlns:r="http://schemas.openxmlformats.org/officeDocument/2006/relationships" xmlns:p="http://schemas.openxmlformats.org/presentationml/2006/main">
   <p:cSld>
     <p:spTree>
@@ -22560,14 +23133,19 @@
             <p:ph type="title"/>
           </p:nvPr>
         </p:nvSpPr>
-        <p:spPr/>
+        <p:spPr>
+          <a:xfrm>
+            <a:off x="1024128" y="573493"/>
+            <a:ext cx="9720072" cy="1499616"/>
+          </a:xfrm>
+        </p:spPr>
         <p:txBody>
           <a:bodyPr/>
           <a:lstStyle/>
           <a:p>
             <a:r>
               <a:rPr lang="en-IN" dirty="0"/>
-              <a:t>Auto scaling</a:t>
+              <a:t>Unlimited + instant auto scaling</a:t>
             </a:r>
           </a:p>
         </p:txBody>
@@ -22612,6 +23190,11 @@
           <a:solidFill>
             <a:schemeClr val="accent1"/>
           </a:solidFill>
+          <a:ln>
+            <a:solidFill>
+              <a:schemeClr val="accent1"/>
+            </a:solidFill>
+          </a:ln>
         </p:spPr>
       </p:pic>
     </p:spTree>
@@ -22627,7 +23210,7 @@
 </p:sld>
 </file>
 
-<file path=ppt/slides/slide15.xml><?xml version="1.0" encoding="utf-8"?>
+<file path=ppt/slides/slide19.xml><?xml version="1.0" encoding="utf-8"?>
 <p:sld xmlns:a="http://schemas.openxmlformats.org/drawingml/2006/main" xmlns:r="http://schemas.openxmlformats.org/officeDocument/2006/relationships" xmlns:p="http://schemas.openxmlformats.org/presentationml/2006/main">
   <p:cSld>
     <p:spTree>
@@ -22649,7 +23232,7 @@
           <p:cNvPr id="2" name="Title 1">
             <a:extLst>
               <a:ext uri="{FF2B5EF4-FFF2-40B4-BE49-F238E27FC236}">
-                <a16:creationId xmlns:a16="http://schemas.microsoft.com/office/drawing/2014/main" id="{6FF7059E-78AF-4A18-BCFD-0635E2B41135}"/>
+                <a16:creationId xmlns:a16="http://schemas.microsoft.com/office/drawing/2014/main" id="{CC848BA4-9CEC-48AC-BECB-C7D4790C95B1}"/>
               </a:ext>
             </a:extLst>
           </p:cNvPr>
@@ -22662,115 +23245,46 @@
         </p:nvSpPr>
         <p:spPr/>
         <p:txBody>
-          <a:bodyPr>
-            <a:normAutofit/>
-          </a:bodyPr>
-          <a:lstStyle/>
-          <a:p>
-            <a:r>
-              <a:rPr lang="en-GB" dirty="0"/>
-              <a:t>End goal of a data architecture</a:t>
-            </a:r>
-            <a:endParaRPr lang="en-IN" dirty="0"/>
-          </a:p>
-        </p:txBody>
-      </p:sp>
-      <p:sp>
-        <p:nvSpPr>
-          <p:cNvPr id="3" name="Content Placeholder 2">
-            <a:extLst>
-              <a:ext uri="{FF2B5EF4-FFF2-40B4-BE49-F238E27FC236}">
-                <a16:creationId xmlns:a16="http://schemas.microsoft.com/office/drawing/2014/main" id="{EB2639B3-9964-4D3C-8F7B-F105DF97B6CE}"/>
-              </a:ext>
-            </a:extLst>
-          </p:cNvPr>
-          <p:cNvSpPr>
-            <a:spLocks noGrp="1"/>
-          </p:cNvSpPr>
-          <p:nvPr>
-            <p:ph idx="1"/>
-          </p:nvPr>
-        </p:nvSpPr>
-        <p:spPr>
-          <a:xfrm>
-            <a:off x="1024128" y="2286000"/>
-            <a:ext cx="4298149" cy="4023360"/>
-          </a:xfrm>
-        </p:spPr>
-        <p:txBody>
           <a:bodyPr/>
           <a:lstStyle/>
           <a:p>
             <a:r>
-              <a:rPr lang="en-GB" dirty="0"/>
-              <a:t>* Architect so that </a:t>
+              <a:rPr lang="en-IN" dirty="0"/>
+              <a:t>Multi-cluster shared data architecture</a:t>
             </a:r>
-            <a:r>
-              <a:rPr lang="en-GB" dirty="0">
-                <a:solidFill>
-                  <a:srgbClr val="0070C0"/>
-                </a:solidFill>
-              </a:rPr>
-              <a:t>copying data</a:t>
-            </a:r>
-            <a:r>
-              <a:rPr lang="en-GB" dirty="0"/>
-              <a:t> gets lesser across teams. </a:t>
-            </a:r>
-          </a:p>
-          <a:p>
-            <a:r>
-              <a:rPr lang="en-GB" dirty="0"/>
-              <a:t>* Allow USER to take SMART decisions. </a:t>
-            </a:r>
-          </a:p>
-          <a:p>
-            <a:r>
-              <a:rPr lang="en-GB" dirty="0"/>
-              <a:t>* Define goal based on customers need. </a:t>
-            </a:r>
-          </a:p>
-          <a:p>
-            <a:endParaRPr lang="en-GB" dirty="0"/>
-          </a:p>
-          <a:p>
-            <a:endParaRPr lang="en-GB" dirty="0"/>
           </a:p>
         </p:txBody>
       </p:sp>
       <p:pic>
         <p:nvPicPr>
-          <p:cNvPr id="5" name="Picture 4">
+          <p:cNvPr id="7" name="Content Placeholder 6">
             <a:extLst>
               <a:ext uri="{FF2B5EF4-FFF2-40B4-BE49-F238E27FC236}">
-                <a16:creationId xmlns:a16="http://schemas.microsoft.com/office/drawing/2014/main" id="{1236E338-05AE-4A9B-8542-634904EB740C}"/>
+                <a16:creationId xmlns:a16="http://schemas.microsoft.com/office/drawing/2014/main" id="{370B388F-95FD-431C-BF82-AF8225DC0A7D}"/>
               </a:ext>
             </a:extLst>
           </p:cNvPr>
           <p:cNvPicPr>
-            <a:picLocks noChangeAspect="1"/>
+            <a:picLocks noGrp="1" noChangeAspect="1"/>
           </p:cNvPicPr>
-          <p:nvPr/>
+          <p:nvPr>
+            <p:ph idx="1"/>
+          </p:nvPr>
         </p:nvPicPr>
         <p:blipFill>
-          <a:blip r:embed="rId3"/>
+          <a:blip r:embed="rId2"/>
           <a:stretch>
             <a:fillRect/>
           </a:stretch>
         </p:blipFill>
         <p:spPr>
           <a:xfrm>
-            <a:off x="5624459" y="2084832"/>
-            <a:ext cx="6129433" cy="2959485"/>
+            <a:off x="3420488" y="2286000"/>
+            <a:ext cx="4927162" cy="4022725"/>
           </a:xfrm>
-          <a:prstGeom prst="rect">
-            <a:avLst/>
-          </a:prstGeom>
-          <a:ln w="19050">
+          <a:ln>
             <a:solidFill>
-              <a:schemeClr val="accent2">
-                <a:lumMod val="50000"/>
-              </a:schemeClr>
+              <a:schemeClr val="accent1"/>
             </a:solidFill>
           </a:ln>
         </p:spPr>
@@ -22778,286 +23292,7 @@
     </p:spTree>
     <p:extLst>
       <p:ext uri="{BB962C8B-B14F-4D97-AF65-F5344CB8AC3E}">
-        <p14:creationId xmlns:p14="http://schemas.microsoft.com/office/powerpoint/2010/main" val="3275927977"/>
-      </p:ext>
-    </p:extLst>
-  </p:cSld>
-  <p:clrMapOvr>
-    <a:masterClrMapping/>
-  </p:clrMapOvr>
-</p:sld>
-</file>
-
-<file path=ppt/slides/slide16.xml><?xml version="1.0" encoding="utf-8"?>
-<p:sld xmlns:a="http://schemas.openxmlformats.org/drawingml/2006/main" xmlns:r="http://schemas.openxmlformats.org/officeDocument/2006/relationships" xmlns:p="http://schemas.openxmlformats.org/presentationml/2006/main">
-  <p:cSld>
-    <p:spTree>
-      <p:nvGrpSpPr>
-        <p:cNvPr id="1" name=""/>
-        <p:cNvGrpSpPr/>
-        <p:nvPr/>
-      </p:nvGrpSpPr>
-      <p:grpSpPr>
-        <a:xfrm>
-          <a:off x="0" y="0"/>
-          <a:ext cx="0" cy="0"/>
-          <a:chOff x="0" y="0"/>
-          <a:chExt cx="0" cy="0"/>
-        </a:xfrm>
-      </p:grpSpPr>
-      <p:sp>
-        <p:nvSpPr>
-          <p:cNvPr id="3" name="Rectangle 2">
-            <a:extLst>
-              <a:ext uri="{FF2B5EF4-FFF2-40B4-BE49-F238E27FC236}">
-                <a16:creationId xmlns:a16="http://schemas.microsoft.com/office/drawing/2014/main" id="{A0565B4C-0698-4E89-8C2C-1B292F5BC0F4}"/>
-              </a:ext>
-            </a:extLst>
-          </p:cNvPr>
-          <p:cNvSpPr/>
-          <p:nvPr/>
-        </p:nvSpPr>
-        <p:spPr>
-          <a:xfrm>
-            <a:off x="1170193" y="751995"/>
-            <a:ext cx="3148149" cy="707886"/>
-          </a:xfrm>
-          <a:prstGeom prst="rect">
-            <a:avLst/>
-          </a:prstGeom>
-        </p:spPr>
-        <p:txBody>
-          <a:bodyPr wrap="square">
-            <a:spAutoFit/>
-          </a:bodyPr>
-          <a:lstStyle/>
-          <a:p>
-            <a:r>
-              <a:rPr lang="en-IN" sz="2000" dirty="0">
-                <a:hlinkClick r:id="rId2"/>
-              </a:rPr>
-              <a:t>https://www.linkedin.com/in/</a:t>
-            </a:r>
-            <a:r>
-              <a:rPr lang="en-IN" sz="2000" b="1" dirty="0">
-                <a:hlinkClick r:id="rId2"/>
-              </a:rPr>
-              <a:t>dinesh-kumar-prabakaran</a:t>
-            </a:r>
-            <a:r>
-              <a:rPr lang="en-IN" sz="2000" b="1" dirty="0"/>
-              <a:t>  </a:t>
-            </a:r>
-            <a:endParaRPr lang="en-IN" sz="2000" dirty="0"/>
-          </a:p>
-        </p:txBody>
-      </p:sp>
-      <p:pic>
-        <p:nvPicPr>
-          <p:cNvPr id="4" name="Picture 3">
-            <a:extLst>
-              <a:ext uri="{FF2B5EF4-FFF2-40B4-BE49-F238E27FC236}">
-                <a16:creationId xmlns:a16="http://schemas.microsoft.com/office/drawing/2014/main" id="{AFE108C9-45B8-4ACD-B48D-53826E73B005}"/>
-              </a:ext>
-            </a:extLst>
-          </p:cNvPr>
-          <p:cNvPicPr>
-            <a:picLocks noChangeAspect="1"/>
-          </p:cNvPicPr>
-          <p:nvPr/>
-        </p:nvPicPr>
-        <p:blipFill>
-          <a:blip r:embed="rId3">
-            <a:extLst>
-              <a:ext uri="{28A0092B-C50C-407E-A947-70E740481C1C}">
-                <a14:useLocalDpi xmlns:a14="http://schemas.microsoft.com/office/drawing/2010/main" val="0"/>
-              </a:ext>
-            </a:extLst>
-          </a:blip>
-          <a:stretch>
-            <a:fillRect/>
-          </a:stretch>
-        </p:blipFill>
-        <p:spPr>
-          <a:xfrm>
-            <a:off x="1097280" y="1496515"/>
-            <a:ext cx="3365411" cy="4846193"/>
-          </a:xfrm>
-          <a:prstGeom prst="rect">
-            <a:avLst/>
-          </a:prstGeom>
-        </p:spPr>
-      </p:pic>
-      <p:pic>
-        <p:nvPicPr>
-          <p:cNvPr id="5" name="Picture 4">
-            <a:extLst>
-              <a:ext uri="{FF2B5EF4-FFF2-40B4-BE49-F238E27FC236}">
-                <a16:creationId xmlns:a16="http://schemas.microsoft.com/office/drawing/2014/main" id="{61376E4F-8E86-4ADF-8710-310054EE79B7}"/>
-              </a:ext>
-            </a:extLst>
-          </p:cNvPr>
-          <p:cNvPicPr>
-            <a:picLocks noChangeAspect="1"/>
-          </p:cNvPicPr>
-          <p:nvPr/>
-        </p:nvPicPr>
-        <p:blipFill>
-          <a:blip r:embed="rId4"/>
-          <a:stretch>
-            <a:fillRect/>
-          </a:stretch>
-        </p:blipFill>
-        <p:spPr>
-          <a:xfrm>
-            <a:off x="1241628" y="5490041"/>
-            <a:ext cx="3076714" cy="746218"/>
-          </a:xfrm>
-          <a:prstGeom prst="rect">
-            <a:avLst/>
-          </a:prstGeom>
-        </p:spPr>
-      </p:pic>
-      <p:sp>
-        <p:nvSpPr>
-          <p:cNvPr id="2" name="Rectangle 1">
-            <a:extLst>
-              <a:ext uri="{FF2B5EF4-FFF2-40B4-BE49-F238E27FC236}">
-                <a16:creationId xmlns:a16="http://schemas.microsoft.com/office/drawing/2014/main" id="{14EA8E2C-6A3B-464A-B046-52F1BE510043}"/>
-              </a:ext>
-            </a:extLst>
-          </p:cNvPr>
-          <p:cNvSpPr/>
-          <p:nvPr/>
-        </p:nvSpPr>
-        <p:spPr>
-          <a:xfrm>
-            <a:off x="5793173" y="1859340"/>
-            <a:ext cx="5091650" cy="1569660"/>
-          </a:xfrm>
-          <a:prstGeom prst="rect">
-            <a:avLst/>
-          </a:prstGeom>
-          <a:noFill/>
-        </p:spPr>
-        <p:txBody>
-          <a:bodyPr wrap="none" lIns="91440" tIns="45720" rIns="91440" bIns="45720">
-            <a:spAutoFit/>
-          </a:bodyPr>
-          <a:lstStyle/>
-          <a:p>
-            <a:pPr algn="ctr"/>
-            <a:r>
-              <a:rPr lang="en-US" sz="9600" dirty="0">
-                <a:ln w="0"/>
-                <a:solidFill>
-                  <a:schemeClr val="accent1"/>
-                </a:solidFill>
-                <a:effectLst>
-                  <a:outerShdw blurRad="38100" dist="25400" dir="5400000" algn="ctr" rotWithShape="0">
-                    <a:srgbClr val="6E747A">
-                      <a:alpha val="43000"/>
-                    </a:srgbClr>
-                  </a:outerShdw>
-                </a:effectLst>
-              </a:rPr>
-              <a:t>Thank you</a:t>
-            </a:r>
-            <a:endParaRPr lang="en-US" sz="9600" b="0" cap="none" spc="0" dirty="0">
-              <a:ln w="0"/>
-              <a:solidFill>
-                <a:schemeClr val="accent1"/>
-              </a:solidFill>
-              <a:effectLst>
-                <a:outerShdw blurRad="38100" dist="25400" dir="5400000" algn="ctr" rotWithShape="0">
-                  <a:srgbClr val="6E747A">
-                    <a:alpha val="43000"/>
-                  </a:srgbClr>
-                </a:outerShdw>
-              </a:effectLst>
-            </a:endParaRPr>
-          </a:p>
-        </p:txBody>
-      </p:sp>
-      <p:sp>
-        <p:nvSpPr>
-          <p:cNvPr id="6" name="Rectangle 5">
-            <a:extLst>
-              <a:ext uri="{FF2B5EF4-FFF2-40B4-BE49-F238E27FC236}">
-                <a16:creationId xmlns:a16="http://schemas.microsoft.com/office/drawing/2014/main" id="{1B351620-7136-4C75-8446-A9390BE83643}"/>
-              </a:ext>
-            </a:extLst>
-          </p:cNvPr>
-          <p:cNvSpPr/>
-          <p:nvPr/>
-        </p:nvSpPr>
-        <p:spPr>
-          <a:xfrm>
-            <a:off x="5341222" y="3677194"/>
-            <a:ext cx="5995552" cy="1569660"/>
-          </a:xfrm>
-          <a:prstGeom prst="rect">
-            <a:avLst/>
-          </a:prstGeom>
-          <a:noFill/>
-        </p:spPr>
-        <p:txBody>
-          <a:bodyPr wrap="none" lIns="91440" tIns="45720" rIns="91440" bIns="45720">
-            <a:spAutoFit/>
-          </a:bodyPr>
-          <a:lstStyle/>
-          <a:p>
-            <a:pPr algn="ctr"/>
-            <a:r>
-              <a:rPr lang="en-US" sz="9600" b="1" spc="50" dirty="0">
-                <a:ln w="9525" cmpd="sng">
-                  <a:solidFill>
-                    <a:schemeClr val="accent1"/>
-                  </a:solidFill>
-                  <a:prstDash val="solid"/>
-                </a:ln>
-                <a:solidFill>
-                  <a:srgbClr val="70AD47">
-                    <a:tint val="1000"/>
-                  </a:srgbClr>
-                </a:solidFill>
-                <a:effectLst>
-                  <a:glow rad="38100">
-                    <a:schemeClr val="accent1">
-                      <a:alpha val="40000"/>
-                    </a:schemeClr>
-                  </a:glow>
-                </a:effectLst>
-              </a:rPr>
-              <a:t>Questions?</a:t>
-            </a:r>
-            <a:endParaRPr lang="en-US" sz="9600" b="1" cap="none" spc="50" dirty="0">
-              <a:ln w="9525" cmpd="sng">
-                <a:solidFill>
-                  <a:schemeClr val="accent1"/>
-                </a:solidFill>
-                <a:prstDash val="solid"/>
-              </a:ln>
-              <a:solidFill>
-                <a:srgbClr val="70AD47">
-                  <a:tint val="1000"/>
-                </a:srgbClr>
-              </a:solidFill>
-              <a:effectLst>
-                <a:glow rad="38100">
-                  <a:schemeClr val="accent1">
-                    <a:alpha val="40000"/>
-                  </a:schemeClr>
-                </a:glow>
-              </a:effectLst>
-            </a:endParaRPr>
-          </a:p>
-        </p:txBody>
-      </p:sp>
-    </p:spTree>
-    <p:extLst>
-      <p:ext uri="{BB962C8B-B14F-4D97-AF65-F5344CB8AC3E}">
-        <p14:creationId xmlns:p14="http://schemas.microsoft.com/office/powerpoint/2010/main" val="375182562"/>
+        <p14:creationId xmlns:p14="http://schemas.microsoft.com/office/powerpoint/2010/main" val="1569372650"/>
       </p:ext>
     </p:extLst>
   </p:cSld>
@@ -23179,6 +23414,583 @@
     <p:extLst>
       <p:ext uri="{BB962C8B-B14F-4D97-AF65-F5344CB8AC3E}">
         <p14:creationId xmlns:p14="http://schemas.microsoft.com/office/powerpoint/2010/main" val="3028317344"/>
+      </p:ext>
+    </p:extLst>
+  </p:cSld>
+  <p:clrMapOvr>
+    <a:masterClrMapping/>
+  </p:clrMapOvr>
+</p:sld>
+</file>
+
+<file path=ppt/slides/slide20.xml><?xml version="1.0" encoding="utf-8"?>
+<p:sld xmlns:a="http://schemas.openxmlformats.org/drawingml/2006/main" xmlns:r="http://schemas.openxmlformats.org/officeDocument/2006/relationships" xmlns:p="http://schemas.openxmlformats.org/presentationml/2006/main">
+  <p:cSld>
+    <p:spTree>
+      <p:nvGrpSpPr>
+        <p:cNvPr id="1" name=""/>
+        <p:cNvGrpSpPr/>
+        <p:nvPr/>
+      </p:nvGrpSpPr>
+      <p:grpSpPr>
+        <a:xfrm>
+          <a:off x="0" y="0"/>
+          <a:ext cx="0" cy="0"/>
+          <a:chOff x="0" y="0"/>
+          <a:chExt cx="0" cy="0"/>
+        </a:xfrm>
+      </p:grpSpPr>
+      <p:sp>
+        <p:nvSpPr>
+          <p:cNvPr id="2" name="Title 1">
+            <a:extLst>
+              <a:ext uri="{FF2B5EF4-FFF2-40B4-BE49-F238E27FC236}">
+                <a16:creationId xmlns:a16="http://schemas.microsoft.com/office/drawing/2014/main" id="{C7B44B6A-F7D4-406C-B312-271EEF8124F6}"/>
+              </a:ext>
+            </a:extLst>
+          </p:cNvPr>
+          <p:cNvSpPr>
+            <a:spLocks noGrp="1"/>
+          </p:cNvSpPr>
+          <p:nvPr>
+            <p:ph type="title"/>
+          </p:nvPr>
+        </p:nvSpPr>
+        <p:spPr/>
+        <p:txBody>
+          <a:bodyPr/>
+          <a:lstStyle/>
+          <a:p>
+            <a:r>
+              <a:rPr lang="en-IN" dirty="0"/>
+              <a:t>No </a:t>
+            </a:r>
+            <a:r>
+              <a:rPr lang="en-IN" dirty="0" err="1"/>
+              <a:t>sre</a:t>
+            </a:r>
+            <a:r>
+              <a:rPr lang="en-IN" dirty="0"/>
+              <a:t>/</a:t>
+            </a:r>
+            <a:r>
+              <a:rPr lang="en-IN" dirty="0" err="1"/>
+              <a:t>devops</a:t>
+            </a:r>
+            <a:r>
+              <a:rPr lang="en-IN" dirty="0"/>
+              <a:t> burden</a:t>
+            </a:r>
+          </a:p>
+        </p:txBody>
+      </p:sp>
+      <p:pic>
+        <p:nvPicPr>
+          <p:cNvPr id="5" name="Content Placeholder 4">
+            <a:extLst>
+              <a:ext uri="{FF2B5EF4-FFF2-40B4-BE49-F238E27FC236}">
+                <a16:creationId xmlns:a16="http://schemas.microsoft.com/office/drawing/2014/main" id="{3F769F33-D494-4B03-92C4-2F91EF374AD2}"/>
+              </a:ext>
+            </a:extLst>
+          </p:cNvPr>
+          <p:cNvPicPr>
+            <a:picLocks noGrp="1" noChangeAspect="1"/>
+          </p:cNvPicPr>
+          <p:nvPr>
+            <p:ph idx="1"/>
+          </p:nvPr>
+        </p:nvPicPr>
+        <p:blipFill>
+          <a:blip r:embed="rId2"/>
+          <a:stretch>
+            <a:fillRect/>
+          </a:stretch>
+        </p:blipFill>
+        <p:spPr>
+          <a:xfrm>
+            <a:off x="1054220" y="2792202"/>
+            <a:ext cx="9659698" cy="3010320"/>
+          </a:xfrm>
+        </p:spPr>
+      </p:pic>
+    </p:spTree>
+    <p:extLst>
+      <p:ext uri="{BB962C8B-B14F-4D97-AF65-F5344CB8AC3E}">
+        <p14:creationId xmlns:p14="http://schemas.microsoft.com/office/powerpoint/2010/main" val="3293747460"/>
+      </p:ext>
+    </p:extLst>
+  </p:cSld>
+  <p:clrMapOvr>
+    <a:masterClrMapping/>
+  </p:clrMapOvr>
+</p:sld>
+</file>
+
+<file path=ppt/slides/slide21.xml><?xml version="1.0" encoding="utf-8"?>
+<p:sld xmlns:a="http://schemas.openxmlformats.org/drawingml/2006/main" xmlns:r="http://schemas.openxmlformats.org/officeDocument/2006/relationships" xmlns:p="http://schemas.openxmlformats.org/presentationml/2006/main">
+  <p:cSld>
+    <p:spTree>
+      <p:nvGrpSpPr>
+        <p:cNvPr id="1" name=""/>
+        <p:cNvGrpSpPr/>
+        <p:nvPr/>
+      </p:nvGrpSpPr>
+      <p:grpSpPr>
+        <a:xfrm>
+          <a:off x="0" y="0"/>
+          <a:ext cx="0" cy="0"/>
+          <a:chOff x="0" y="0"/>
+          <a:chExt cx="0" cy="0"/>
+        </a:xfrm>
+      </p:grpSpPr>
+      <p:sp>
+        <p:nvSpPr>
+          <p:cNvPr id="2" name="Title 1">
+            <a:extLst>
+              <a:ext uri="{FF2B5EF4-FFF2-40B4-BE49-F238E27FC236}">
+                <a16:creationId xmlns:a16="http://schemas.microsoft.com/office/drawing/2014/main" id="{B26BD99F-BDC3-412C-BAA2-0869672FB15B}"/>
+              </a:ext>
+            </a:extLst>
+          </p:cNvPr>
+          <p:cNvSpPr>
+            <a:spLocks noGrp="1"/>
+          </p:cNvSpPr>
+          <p:nvPr>
+            <p:ph type="title"/>
+          </p:nvPr>
+        </p:nvSpPr>
+        <p:spPr/>
+        <p:txBody>
+          <a:bodyPr/>
+          <a:lstStyle/>
+          <a:p>
+            <a:r>
+              <a:rPr lang="en-IN" dirty="0"/>
+              <a:t>SEMI-structured data</a:t>
+            </a:r>
+          </a:p>
+        </p:txBody>
+      </p:sp>
+      <p:pic>
+        <p:nvPicPr>
+          <p:cNvPr id="5" name="Content Placeholder 4">
+            <a:extLst>
+              <a:ext uri="{FF2B5EF4-FFF2-40B4-BE49-F238E27FC236}">
+                <a16:creationId xmlns:a16="http://schemas.microsoft.com/office/drawing/2014/main" id="{FB061672-1E4A-4A5A-9B5E-DEC76FF9CB66}"/>
+              </a:ext>
+            </a:extLst>
+          </p:cNvPr>
+          <p:cNvPicPr>
+            <a:picLocks noGrp="1" noChangeAspect="1"/>
+          </p:cNvPicPr>
+          <p:nvPr>
+            <p:ph idx="1"/>
+          </p:nvPr>
+        </p:nvPicPr>
+        <p:blipFill>
+          <a:blip r:embed="rId2"/>
+          <a:stretch>
+            <a:fillRect/>
+          </a:stretch>
+        </p:blipFill>
+        <p:spPr>
+          <a:xfrm>
+            <a:off x="1378329" y="2286000"/>
+            <a:ext cx="9011480" cy="4022725"/>
+          </a:xfrm>
+          <a:ln>
+            <a:solidFill>
+              <a:schemeClr val="accent1"/>
+            </a:solidFill>
+          </a:ln>
+        </p:spPr>
+      </p:pic>
+    </p:spTree>
+    <p:extLst>
+      <p:ext uri="{BB962C8B-B14F-4D97-AF65-F5344CB8AC3E}">
+        <p14:creationId xmlns:p14="http://schemas.microsoft.com/office/powerpoint/2010/main" val="215234534"/>
+      </p:ext>
+    </p:extLst>
+  </p:cSld>
+  <p:clrMapOvr>
+    <a:masterClrMapping/>
+  </p:clrMapOvr>
+</p:sld>
+</file>
+
+<file path=ppt/slides/slide22.xml><?xml version="1.0" encoding="utf-8"?>
+<p:sld xmlns:a="http://schemas.openxmlformats.org/drawingml/2006/main" xmlns:r="http://schemas.openxmlformats.org/officeDocument/2006/relationships" xmlns:p="http://schemas.openxmlformats.org/presentationml/2006/main">
+  <p:cSld>
+    <p:spTree>
+      <p:nvGrpSpPr>
+        <p:cNvPr id="1" name=""/>
+        <p:cNvGrpSpPr/>
+        <p:nvPr/>
+      </p:nvGrpSpPr>
+      <p:grpSpPr>
+        <a:xfrm>
+          <a:off x="0" y="0"/>
+          <a:ext cx="0" cy="0"/>
+          <a:chOff x="0" y="0"/>
+          <a:chExt cx="0" cy="0"/>
+        </a:xfrm>
+      </p:grpSpPr>
+      <p:sp>
+        <p:nvSpPr>
+          <p:cNvPr id="2" name="Title 1">
+            <a:extLst>
+              <a:ext uri="{FF2B5EF4-FFF2-40B4-BE49-F238E27FC236}">
+                <a16:creationId xmlns:a16="http://schemas.microsoft.com/office/drawing/2014/main" id="{56AACF40-DC80-407B-9CD3-5AFDD95B2D4C}"/>
+              </a:ext>
+            </a:extLst>
+          </p:cNvPr>
+          <p:cNvSpPr>
+            <a:spLocks noGrp="1"/>
+          </p:cNvSpPr>
+          <p:nvPr>
+            <p:ph type="title"/>
+          </p:nvPr>
+        </p:nvSpPr>
+        <p:spPr/>
+        <p:txBody>
+          <a:bodyPr/>
+          <a:lstStyle/>
+          <a:p>
+            <a:r>
+              <a:rPr lang="en-IN" dirty="0"/>
+              <a:t>Accessing snowflake</a:t>
+            </a:r>
+          </a:p>
+        </p:txBody>
+      </p:sp>
+      <p:pic>
+        <p:nvPicPr>
+          <p:cNvPr id="7" name="Content Placeholder 6">
+            <a:extLst>
+              <a:ext uri="{FF2B5EF4-FFF2-40B4-BE49-F238E27FC236}">
+                <a16:creationId xmlns:a16="http://schemas.microsoft.com/office/drawing/2014/main" id="{02E752BD-E224-4E31-BFE7-4236CA5FB318}"/>
+              </a:ext>
+            </a:extLst>
+          </p:cNvPr>
+          <p:cNvPicPr>
+            <a:picLocks noGrp="1" noChangeAspect="1"/>
+          </p:cNvPicPr>
+          <p:nvPr>
+            <p:ph idx="1"/>
+          </p:nvPr>
+        </p:nvPicPr>
+        <p:blipFill>
+          <a:blip r:embed="rId2"/>
+          <a:stretch>
+            <a:fillRect/>
+          </a:stretch>
+        </p:blipFill>
+        <p:spPr>
+          <a:xfrm>
+            <a:off x="2598150" y="2286000"/>
+            <a:ext cx="6571837" cy="4022725"/>
+          </a:xfrm>
+        </p:spPr>
+      </p:pic>
+    </p:spTree>
+    <p:extLst>
+      <p:ext uri="{BB962C8B-B14F-4D97-AF65-F5344CB8AC3E}">
+        <p14:creationId xmlns:p14="http://schemas.microsoft.com/office/powerpoint/2010/main" val="3632539171"/>
+      </p:ext>
+    </p:extLst>
+  </p:cSld>
+  <p:clrMapOvr>
+    <a:masterClrMapping/>
+  </p:clrMapOvr>
+</p:sld>
+</file>
+
+<file path=ppt/slides/slide23.xml><?xml version="1.0" encoding="utf-8"?>
+<p:sld xmlns:a="http://schemas.openxmlformats.org/drawingml/2006/main" xmlns:r="http://schemas.openxmlformats.org/officeDocument/2006/relationships" xmlns:p="http://schemas.openxmlformats.org/presentationml/2006/main">
+  <p:cSld>
+    <p:spTree>
+      <p:nvGrpSpPr>
+        <p:cNvPr id="1" name=""/>
+        <p:cNvGrpSpPr/>
+        <p:nvPr/>
+      </p:nvGrpSpPr>
+      <p:grpSpPr>
+        <a:xfrm>
+          <a:off x="0" y="0"/>
+          <a:ext cx="0" cy="0"/>
+          <a:chOff x="0" y="0"/>
+          <a:chExt cx="0" cy="0"/>
+        </a:xfrm>
+      </p:grpSpPr>
+      <p:sp>
+        <p:nvSpPr>
+          <p:cNvPr id="2" name="Title 1">
+            <a:extLst>
+              <a:ext uri="{FF2B5EF4-FFF2-40B4-BE49-F238E27FC236}">
+                <a16:creationId xmlns:a16="http://schemas.microsoft.com/office/drawing/2014/main" id="{6FF7059E-78AF-4A18-BCFD-0635E2B41135}"/>
+              </a:ext>
+            </a:extLst>
+          </p:cNvPr>
+          <p:cNvSpPr>
+            <a:spLocks noGrp="1"/>
+          </p:cNvSpPr>
+          <p:nvPr>
+            <p:ph type="title"/>
+          </p:nvPr>
+        </p:nvSpPr>
+        <p:spPr/>
+        <p:txBody>
+          <a:bodyPr>
+            <a:normAutofit/>
+          </a:bodyPr>
+          <a:lstStyle/>
+          <a:p>
+            <a:r>
+              <a:rPr lang="en-GB" dirty="0"/>
+              <a:t>End goal of a data architecture</a:t>
+            </a:r>
+            <a:endParaRPr lang="en-IN" dirty="0"/>
+          </a:p>
+        </p:txBody>
+      </p:sp>
+      <p:sp>
+        <p:nvSpPr>
+          <p:cNvPr id="3" name="Content Placeholder 2">
+            <a:extLst>
+              <a:ext uri="{FF2B5EF4-FFF2-40B4-BE49-F238E27FC236}">
+                <a16:creationId xmlns:a16="http://schemas.microsoft.com/office/drawing/2014/main" id="{EB2639B3-9964-4D3C-8F7B-F105DF97B6CE}"/>
+              </a:ext>
+            </a:extLst>
+          </p:cNvPr>
+          <p:cNvSpPr>
+            <a:spLocks noGrp="1"/>
+          </p:cNvSpPr>
+          <p:nvPr>
+            <p:ph idx="1"/>
+          </p:nvPr>
+        </p:nvSpPr>
+        <p:spPr>
+          <a:xfrm>
+            <a:off x="1024128" y="2286000"/>
+            <a:ext cx="4298149" cy="4023360"/>
+          </a:xfrm>
+        </p:spPr>
+        <p:txBody>
+          <a:bodyPr/>
+          <a:lstStyle/>
+          <a:p>
+            <a:r>
+              <a:rPr lang="en-GB" dirty="0"/>
+              <a:t>* Architect so that </a:t>
+            </a:r>
+            <a:r>
+              <a:rPr lang="en-GB" dirty="0">
+                <a:solidFill>
+                  <a:srgbClr val="0070C0"/>
+                </a:solidFill>
+              </a:rPr>
+              <a:t>copying data</a:t>
+            </a:r>
+            <a:r>
+              <a:rPr lang="en-GB" dirty="0"/>
+              <a:t> gets lesser across teams.</a:t>
+            </a:r>
+          </a:p>
+          <a:p>
+            <a:r>
+              <a:rPr lang="en-GB" dirty="0"/>
+              <a:t> </a:t>
+            </a:r>
+          </a:p>
+          <a:p>
+            <a:r>
+              <a:rPr lang="en-GB" dirty="0"/>
+              <a:t>* Allow USER to take SMART decisions. </a:t>
+            </a:r>
+          </a:p>
+          <a:p>
+            <a:endParaRPr lang="en-GB" dirty="0"/>
+          </a:p>
+          <a:p>
+            <a:r>
+              <a:rPr lang="en-GB" dirty="0"/>
+              <a:t>* Define goal based on customers need. </a:t>
+            </a:r>
+          </a:p>
+          <a:p>
+            <a:endParaRPr lang="en-GB" dirty="0"/>
+          </a:p>
+          <a:p>
+            <a:endParaRPr lang="en-GB" dirty="0"/>
+          </a:p>
+        </p:txBody>
+      </p:sp>
+      <p:pic>
+        <p:nvPicPr>
+          <p:cNvPr id="5" name="Picture 4">
+            <a:extLst>
+              <a:ext uri="{FF2B5EF4-FFF2-40B4-BE49-F238E27FC236}">
+                <a16:creationId xmlns:a16="http://schemas.microsoft.com/office/drawing/2014/main" id="{1236E338-05AE-4A9B-8542-634904EB740C}"/>
+              </a:ext>
+            </a:extLst>
+          </p:cNvPr>
+          <p:cNvPicPr>
+            <a:picLocks noChangeAspect="1"/>
+          </p:cNvPicPr>
+          <p:nvPr/>
+        </p:nvPicPr>
+        <p:blipFill>
+          <a:blip r:embed="rId3"/>
+          <a:stretch>
+            <a:fillRect/>
+          </a:stretch>
+        </p:blipFill>
+        <p:spPr>
+          <a:xfrm>
+            <a:off x="5601013" y="2817937"/>
+            <a:ext cx="6129433" cy="2959485"/>
+          </a:xfrm>
+          <a:prstGeom prst="rect">
+            <a:avLst/>
+          </a:prstGeom>
+          <a:ln w="19050">
+            <a:solidFill>
+              <a:schemeClr val="accent2">
+                <a:lumMod val="50000"/>
+              </a:schemeClr>
+            </a:solidFill>
+          </a:ln>
+        </p:spPr>
+      </p:pic>
+    </p:spTree>
+    <p:extLst>
+      <p:ext uri="{BB962C8B-B14F-4D97-AF65-F5344CB8AC3E}">
+        <p14:creationId xmlns:p14="http://schemas.microsoft.com/office/powerpoint/2010/main" val="3275927977"/>
+      </p:ext>
+    </p:extLst>
+  </p:cSld>
+  <p:clrMapOvr>
+    <a:masterClrMapping/>
+  </p:clrMapOvr>
+</p:sld>
+</file>
+
+<file path=ppt/slides/slide24.xml><?xml version="1.0" encoding="utf-8"?>
+<p:sld xmlns:a="http://schemas.openxmlformats.org/drawingml/2006/main" xmlns:r="http://schemas.openxmlformats.org/officeDocument/2006/relationships" xmlns:p="http://schemas.openxmlformats.org/presentationml/2006/main">
+  <p:cSld>
+    <p:spTree>
+      <p:nvGrpSpPr>
+        <p:cNvPr id="1" name=""/>
+        <p:cNvGrpSpPr/>
+        <p:nvPr/>
+      </p:nvGrpSpPr>
+      <p:grpSpPr>
+        <a:xfrm>
+          <a:off x="0" y="0"/>
+          <a:ext cx="0" cy="0"/>
+          <a:chOff x="0" y="0"/>
+          <a:chExt cx="0" cy="0"/>
+        </a:xfrm>
+      </p:grpSpPr>
+      <p:pic>
+        <p:nvPicPr>
+          <p:cNvPr id="2050" name="Picture 2">
+            <a:extLst>
+              <a:ext uri="{FF2B5EF4-FFF2-40B4-BE49-F238E27FC236}">
+                <a16:creationId xmlns:a16="http://schemas.microsoft.com/office/drawing/2014/main" id="{7D2F6007-FCA3-40ED-8671-3EA08740B458}"/>
+              </a:ext>
+            </a:extLst>
+          </p:cNvPr>
+          <p:cNvPicPr>
+            <a:picLocks noChangeAspect="1" noChangeArrowheads="1"/>
+          </p:cNvPicPr>
+          <p:nvPr/>
+        </p:nvPicPr>
+        <p:blipFill>
+          <a:blip r:embed="rId2">
+            <a:extLst>
+              <a:ext uri="{28A0092B-C50C-407E-A947-70E740481C1C}">
+                <a14:useLocalDpi xmlns:a14="http://schemas.microsoft.com/office/drawing/2010/main" val="0"/>
+              </a:ext>
+            </a:extLst>
+          </a:blip>
+          <a:srcRect/>
+          <a:stretch>
+            <a:fillRect/>
+          </a:stretch>
+        </p:blipFill>
+        <p:spPr bwMode="auto">
+          <a:xfrm>
+            <a:off x="1524000" y="0"/>
+            <a:ext cx="9144000" cy="6858000"/>
+          </a:xfrm>
+          <a:prstGeom prst="rect">
+            <a:avLst/>
+          </a:prstGeom>
+          <a:noFill/>
+          <a:extLst>
+            <a:ext uri="{909E8E84-426E-40DD-AFC4-6F175D3DCCD1}">
+              <a14:hiddenFill xmlns:a14="http://schemas.microsoft.com/office/drawing/2010/main">
+                <a:solidFill>
+                  <a:srgbClr val="FFFFFF"/>
+                </a:solidFill>
+              </a14:hiddenFill>
+            </a:ext>
+          </a:extLst>
+        </p:spPr>
+      </p:pic>
+      <p:sp>
+        <p:nvSpPr>
+          <p:cNvPr id="2" name="Rectangle 1">
+            <a:extLst>
+              <a:ext uri="{FF2B5EF4-FFF2-40B4-BE49-F238E27FC236}">
+                <a16:creationId xmlns:a16="http://schemas.microsoft.com/office/drawing/2014/main" id="{0E165932-6FEE-4EBB-AB44-BFA0319CE7A1}"/>
+              </a:ext>
+            </a:extLst>
+          </p:cNvPr>
+          <p:cNvSpPr/>
+          <p:nvPr/>
+        </p:nvSpPr>
+        <p:spPr>
+          <a:xfrm>
+            <a:off x="5251447" y="-1"/>
+            <a:ext cx="6940553" cy="1569660"/>
+          </a:xfrm>
+          <a:prstGeom prst="rect">
+            <a:avLst/>
+          </a:prstGeom>
+          <a:noFill/>
+        </p:spPr>
+        <p:txBody>
+          <a:bodyPr wrap="square" lIns="91440" tIns="45720" rIns="91440" bIns="45720">
+            <a:spAutoFit/>
+          </a:bodyPr>
+          <a:lstStyle/>
+          <a:p>
+            <a:pPr algn="ctr"/>
+            <a:r>
+              <a:rPr lang="en-US" sz="9600" b="0" cap="none" spc="0" dirty="0">
+                <a:ln w="0"/>
+                <a:solidFill>
+                  <a:schemeClr val="accent1"/>
+                </a:solidFill>
+                <a:effectLst>
+                  <a:outerShdw blurRad="38100" dist="25400" dir="5400000" algn="ctr" rotWithShape="0">
+                    <a:srgbClr val="6E747A">
+                      <a:alpha val="43000"/>
+                    </a:srgbClr>
+                  </a:outerShdw>
+                </a:effectLst>
+              </a:rPr>
+              <a:t>Questions ??</a:t>
+            </a:r>
+          </a:p>
+        </p:txBody>
+      </p:sp>
+    </p:spTree>
+    <p:extLst>
+      <p:ext uri="{BB962C8B-B14F-4D97-AF65-F5344CB8AC3E}">
+        <p14:creationId xmlns:p14="http://schemas.microsoft.com/office/powerpoint/2010/main" val="974040267"/>
       </p:ext>
     </p:extLst>
   </p:cSld>
@@ -23546,7 +24358,7 @@
           <p:cNvPr id="2" name="Title 1">
             <a:extLst>
               <a:ext uri="{FF2B5EF4-FFF2-40B4-BE49-F238E27FC236}">
-                <a16:creationId xmlns:a16="http://schemas.microsoft.com/office/drawing/2014/main" id="{5B87CF65-8203-45A0-8A1D-449B3DDD5664}"/>
+                <a16:creationId xmlns:a16="http://schemas.microsoft.com/office/drawing/2014/main" id="{03497588-1D90-4664-94F0-F3F2A2060189}"/>
               </a:ext>
             </a:extLst>
           </p:cNvPr>
@@ -23563,10 +24375,9 @@
           <a:lstStyle/>
           <a:p>
             <a:r>
-              <a:rPr lang="en-GB" dirty="0"/>
+              <a:rPr lang="en-IN" dirty="0"/>
               <a:t>Database</a:t>
             </a:r>
-            <a:endParaRPr lang="en-IN" dirty="0"/>
           </a:p>
         </p:txBody>
       </p:sp>
@@ -23575,7 +24386,7 @@
           <p:cNvPr id="3" name="Content Placeholder 2">
             <a:extLst>
               <a:ext uri="{FF2B5EF4-FFF2-40B4-BE49-F238E27FC236}">
-                <a16:creationId xmlns:a16="http://schemas.microsoft.com/office/drawing/2014/main" id="{86CBC334-2225-4ED6-8E26-6DDD7BD9E2FA}"/>
+                <a16:creationId xmlns:a16="http://schemas.microsoft.com/office/drawing/2014/main" id="{F2B80727-A8FD-4721-911B-64DC5F8EBD32}"/>
               </a:ext>
             </a:extLst>
           </p:cNvPr>
@@ -23583,27 +24394,22 @@
             <a:spLocks noGrp="1"/>
           </p:cNvSpPr>
           <p:nvPr>
-            <p:ph idx="1"/>
+            <p:ph sz="half" idx="1"/>
           </p:nvPr>
         </p:nvSpPr>
-        <p:spPr>
-          <a:xfrm>
-            <a:off x="1024129" y="2286000"/>
-            <a:ext cx="4070385" cy="4023360"/>
-          </a:xfrm>
-        </p:spPr>
+        <p:spPr/>
         <p:txBody>
           <a:bodyPr>
-            <a:normAutofit fontScale="92500" lnSpcReduction="20000"/>
+            <a:normAutofit/>
           </a:bodyPr>
           <a:lstStyle/>
           <a:p>
             <a:r>
-              <a:rPr lang="en-GB" dirty="0"/>
+              <a:rPr lang="en-GB" sz="1500" dirty="0"/>
               <a:t>* </a:t>
             </a:r>
             <a:r>
-              <a:rPr lang="en-GB" dirty="0">
+              <a:rPr lang="en-GB" sz="1500" dirty="0">
                 <a:solidFill>
                   <a:srgbClr val="0070C0"/>
                 </a:solidFill>
@@ -23616,11 +24422,11 @@
               <a:buNone/>
             </a:pPr>
             <a:r>
-              <a:rPr lang="en-GB" dirty="0"/>
+              <a:rPr lang="en-GB" sz="1500" dirty="0"/>
               <a:t> * </a:t>
             </a:r>
             <a:r>
-              <a:rPr lang="en-GB" dirty="0">
+              <a:rPr lang="en-GB" sz="1500" dirty="0">
                 <a:solidFill>
                   <a:srgbClr val="0070C0"/>
                 </a:solidFill>
@@ -23629,17 +24435,17 @@
             </a:r>
           </a:p>
           <a:p>
-            <a:endParaRPr lang="en-GB" dirty="0"/>
+            <a:endParaRPr lang="en-GB" sz="1500" dirty="0"/>
           </a:p>
           <a:p>
             <a:r>
-              <a:rPr lang="en-GB" dirty="0"/>
+              <a:rPr lang="en-GB" sz="1500" dirty="0"/>
               <a:t>* Recommended for,</a:t>
             </a:r>
           </a:p>
           <a:p>
             <a:r>
-              <a:rPr lang="en-GB" sz="1900" dirty="0"/>
+              <a:rPr lang="en-GB" sz="1500" dirty="0"/>
               <a:t>- Structured data of less than a TB, </a:t>
             </a:r>
           </a:p>
@@ -23648,99 +24454,85 @@
               <a:buNone/>
             </a:pPr>
             <a:r>
-              <a:rPr lang="en-GB" sz="1900" dirty="0"/>
+              <a:rPr lang="en-GB" sz="1500" dirty="0"/>
               <a:t>  - Purpose - OLTP.</a:t>
             </a:r>
           </a:p>
           <a:p>
-            <a:endParaRPr lang="en-GB" dirty="0"/>
+            <a:endParaRPr lang="en-GB" sz="1500" dirty="0"/>
           </a:p>
           <a:p>
             <a:r>
-              <a:rPr lang="en-GB" dirty="0"/>
+              <a:rPr lang="en-GB" sz="1500" dirty="0"/>
               <a:t>* Not recommended for,</a:t>
             </a:r>
           </a:p>
           <a:p>
             <a:r>
-              <a:rPr lang="en-GB" sz="1900" dirty="0"/>
+              <a:rPr lang="en-GB" sz="1500" dirty="0"/>
               <a:t>- Ad-hoc analytics.</a:t>
             </a:r>
           </a:p>
           <a:p>
             <a:r>
-              <a:rPr lang="en-GB" sz="1900" dirty="0"/>
+              <a:rPr lang="en-GB" sz="1500" dirty="0"/>
               <a:t>- More dependency in </a:t>
             </a:r>
             <a:r>
-              <a:rPr lang="en-GB" sz="1900" dirty="0" err="1"/>
+              <a:rPr lang="en-GB" sz="1500" dirty="0" err="1"/>
               <a:t>sharding</a:t>
             </a:r>
             <a:r>
-              <a:rPr lang="en-GB" sz="1900" dirty="0"/>
+              <a:rPr lang="en-GB" sz="1500" dirty="0"/>
               <a:t>.</a:t>
             </a:r>
+          </a:p>
+          <a:p>
+            <a:endParaRPr lang="en-IN" sz="1500" dirty="0"/>
           </a:p>
         </p:txBody>
       </p:sp>
       <p:pic>
         <p:nvPicPr>
-          <p:cNvPr id="2050" name="Picture 2" descr="shared-disk-architecture">
+          <p:cNvPr id="11" name="Content Placeholder 5">
             <a:extLst>
               <a:ext uri="{FF2B5EF4-FFF2-40B4-BE49-F238E27FC236}">
-                <a16:creationId xmlns:a16="http://schemas.microsoft.com/office/drawing/2014/main" id="{FD35294B-7B9D-4B54-B80D-88A923A01390}"/>
+                <a16:creationId xmlns:a16="http://schemas.microsoft.com/office/drawing/2014/main" id="{2BACD9C0-D37E-4023-9908-F5160EC22F55}"/>
               </a:ext>
             </a:extLst>
           </p:cNvPr>
           <p:cNvPicPr>
-            <a:picLocks noChangeAspect="1" noChangeArrowheads="1"/>
+            <a:picLocks noGrp="1" noChangeAspect="1"/>
           </p:cNvPicPr>
-          <p:nvPr/>
+          <p:nvPr>
+            <p:ph sz="half" idx="2"/>
+          </p:nvPr>
         </p:nvPicPr>
         <p:blipFill>
-          <a:blip r:embed="rId3">
-            <a:extLst>
-              <a:ext uri="{28A0092B-C50C-407E-A947-70E740481C1C}">
-                <a14:useLocalDpi xmlns:a14="http://schemas.microsoft.com/office/drawing/2010/main" val="0"/>
-              </a:ext>
-            </a:extLst>
-          </a:blip>
-          <a:srcRect/>
+          <a:blip r:embed="rId2"/>
           <a:stretch>
             <a:fillRect/>
           </a:stretch>
         </p:blipFill>
-        <p:spPr bwMode="auto">
+        <p:spPr>
           <a:xfrm>
-            <a:off x="5352107" y="2455817"/>
-            <a:ext cx="6074855" cy="3566160"/>
+            <a:off x="6036739" y="2286000"/>
+            <a:ext cx="4660360" cy="4022725"/>
           </a:xfrm>
           <a:prstGeom prst="rect">
             <a:avLst/>
           </a:prstGeom>
-          <a:noFill/>
-          <a:ln w="19050">
+          <a:ln>
             <a:solidFill>
-              <a:schemeClr val="accent2">
-                <a:lumMod val="50000"/>
-              </a:schemeClr>
+              <a:schemeClr val="accent1"/>
             </a:solidFill>
           </a:ln>
-          <a:extLst>
-            <a:ext uri="{909E8E84-426E-40DD-AFC4-6F175D3DCCD1}">
-              <a14:hiddenFill xmlns:a14="http://schemas.microsoft.com/office/drawing/2010/main">
-                <a:solidFill>
-                  <a:srgbClr val="FFFFFF"/>
-                </a:solidFill>
-              </a14:hiddenFill>
-            </a:ext>
-          </a:extLst>
         </p:spPr>
       </p:pic>
     </p:spTree>
     <p:extLst>
       <p:ext uri="{BB962C8B-B14F-4D97-AF65-F5344CB8AC3E}">
-        <p14:creationId xmlns:p14="http://schemas.microsoft.com/office/powerpoint/2010/main" val="1944598716"/>
+        <p14:creationId xmlns:p14="http://schemas.microsoft.com/office/powerpoint/2010/main" val="2313323076"/>
       </p:ext>
     </p:extLst>
   </p:cSld>
@@ -24129,7 +24921,7 @@
           <p:cNvPr id="2" name="Title 1">
             <a:extLst>
               <a:ext uri="{FF2B5EF4-FFF2-40B4-BE49-F238E27FC236}">
-                <a16:creationId xmlns:a16="http://schemas.microsoft.com/office/drawing/2014/main" id="{5B87CF65-8203-45A0-8A1D-449B3DDD5664}"/>
+                <a16:creationId xmlns:a16="http://schemas.microsoft.com/office/drawing/2014/main" id="{7C8F623B-BCB3-4DAA-B04D-1A2C4FC782EB}"/>
               </a:ext>
             </a:extLst>
           </p:cNvPr>
@@ -24146,10 +24938,9 @@
           <a:lstStyle/>
           <a:p>
             <a:r>
-              <a:rPr lang="en-GB" dirty="0"/>
-              <a:t>Data Warehouse</a:t>
+              <a:rPr lang="en-IN" dirty="0"/>
+              <a:t>Data warehouse</a:t>
             </a:r>
-            <a:endParaRPr lang="en-IN" dirty="0"/>
           </a:p>
         </p:txBody>
       </p:sp>
@@ -24158,7 +24949,7 @@
           <p:cNvPr id="3" name="Content Placeholder 2">
             <a:extLst>
               <a:ext uri="{FF2B5EF4-FFF2-40B4-BE49-F238E27FC236}">
-                <a16:creationId xmlns:a16="http://schemas.microsoft.com/office/drawing/2014/main" id="{86CBC334-2225-4ED6-8E26-6DDD7BD9E2FA}"/>
+                <a16:creationId xmlns:a16="http://schemas.microsoft.com/office/drawing/2014/main" id="{C9F4A5F8-2464-4FF4-8934-9880D0572806}"/>
               </a:ext>
             </a:extLst>
           </p:cNvPr>
@@ -24166,27 +24957,22 @@
             <a:spLocks noGrp="1"/>
           </p:cNvSpPr>
           <p:nvPr>
-            <p:ph idx="1"/>
+            <p:ph sz="half" idx="1"/>
           </p:nvPr>
         </p:nvSpPr>
-        <p:spPr>
-          <a:xfrm>
-            <a:off x="1024128" y="2286000"/>
-            <a:ext cx="3809129" cy="4023360"/>
-          </a:xfrm>
-        </p:spPr>
+        <p:spPr/>
         <p:txBody>
           <a:bodyPr>
-            <a:normAutofit fontScale="70000" lnSpcReduction="20000"/>
+            <a:noAutofit/>
           </a:bodyPr>
           <a:lstStyle/>
           <a:p>
             <a:r>
-              <a:rPr lang="en-GB" dirty="0"/>
+              <a:rPr lang="en-GB" sz="1500" dirty="0"/>
               <a:t>* </a:t>
             </a:r>
             <a:r>
-              <a:rPr lang="en-GB" dirty="0">
+              <a:rPr lang="en-GB" sz="1500" dirty="0">
                 <a:solidFill>
                   <a:srgbClr val="0070C0"/>
                 </a:solidFill>
@@ -24196,7 +24982,7 @@
           </a:p>
           <a:p>
             <a:r>
-              <a:rPr lang="en-GB" dirty="0">
+              <a:rPr lang="en-GB" sz="1500" dirty="0">
                 <a:solidFill>
                   <a:srgbClr val="0070C0"/>
                 </a:solidFill>
@@ -24205,7 +24991,7 @@
             </a:r>
           </a:p>
           <a:p>
-            <a:endParaRPr lang="en-GB" dirty="0">
+            <a:endParaRPr lang="en-GB" sz="1500" dirty="0">
               <a:solidFill>
                 <a:srgbClr val="0070C0"/>
               </a:solidFill>
@@ -24213,87 +24999,87 @@
           </a:p>
           <a:p>
             <a:r>
-              <a:rPr lang="en-GB" dirty="0"/>
+              <a:rPr lang="en-GB" sz="1500" dirty="0"/>
               <a:t>* Recommended,</a:t>
             </a:r>
           </a:p>
           <a:p>
             <a:r>
-              <a:rPr lang="en-GB" sz="2100" dirty="0"/>
-              <a:t>- If you know metadata &amp; schema/format of analytics to be done.</a:t>
+              <a:rPr lang="en-GB" sz="1500" dirty="0"/>
+              <a:t>- If you know metadata &amp; format of analytics to be done.</a:t>
             </a:r>
           </a:p>
           <a:p>
             <a:r>
-              <a:rPr lang="en-GB" sz="2100" dirty="0"/>
-              <a:t>- Decided that ML/AI not needed much; </a:t>
+              <a:rPr lang="en-GB" sz="1500" dirty="0"/>
+              <a:t>- ML/AI not needed much. Query not over large dataset.</a:t>
             </a:r>
           </a:p>
           <a:p>
             <a:r>
-              <a:rPr lang="en-GB" sz="2100" dirty="0"/>
+              <a:rPr lang="en-GB" sz="1500" dirty="0"/>
               <a:t>- Expose out; allowing customers to analyse.</a:t>
             </a:r>
           </a:p>
           <a:p>
-            <a:endParaRPr lang="en-GB" dirty="0"/>
+            <a:endParaRPr lang="en-GB" sz="1500" dirty="0"/>
           </a:p>
           <a:p>
             <a:r>
-              <a:rPr lang="en-GB" dirty="0"/>
+              <a:rPr lang="en-GB" sz="1500" dirty="0"/>
               <a:t>* Not recommended, </a:t>
             </a:r>
           </a:p>
           <a:p>
             <a:r>
-              <a:rPr lang="en-GB" dirty="0"/>
+              <a:rPr lang="en-GB" sz="1500" dirty="0"/>
               <a:t>- Unstructured data like image and video.</a:t>
             </a:r>
           </a:p>
           <a:p>
             <a:r>
-              <a:rPr lang="en-GB" dirty="0"/>
+              <a:rPr lang="en-GB" sz="1500" dirty="0"/>
               <a:t>- Semi-structured with multiple levels.</a:t>
             </a:r>
           </a:p>
           <a:p>
-            <a:endParaRPr lang="en-GB" dirty="0"/>
+            <a:endParaRPr lang="en-GB" sz="1500" dirty="0"/>
           </a:p>
         </p:txBody>
       </p:sp>
       <p:pic>
         <p:nvPicPr>
-          <p:cNvPr id="5" name="Picture 4">
+          <p:cNvPr id="5" name="Content Placeholder 4">
             <a:extLst>
               <a:ext uri="{FF2B5EF4-FFF2-40B4-BE49-F238E27FC236}">
-                <a16:creationId xmlns:a16="http://schemas.microsoft.com/office/drawing/2014/main" id="{30CCA892-55F8-44F1-9663-F94598196AC0}"/>
+                <a16:creationId xmlns:a16="http://schemas.microsoft.com/office/drawing/2014/main" id="{FB495B05-1045-40BE-9257-A4703CEEE386}"/>
               </a:ext>
             </a:extLst>
           </p:cNvPr>
           <p:cNvPicPr>
-            <a:picLocks noChangeAspect="1"/>
+            <a:picLocks noGrp="1" noChangeAspect="1"/>
           </p:cNvPicPr>
-          <p:nvPr/>
+          <p:nvPr>
+            <p:ph sz="half" idx="2"/>
+          </p:nvPr>
         </p:nvPicPr>
         <p:blipFill>
-          <a:blip r:embed="rId3"/>
+          <a:blip r:embed="rId2"/>
           <a:stretch>
             <a:fillRect/>
           </a:stretch>
         </p:blipFill>
         <p:spPr>
           <a:xfrm>
-            <a:off x="4833257" y="1530967"/>
-            <a:ext cx="7037933" cy="4741817"/>
+            <a:off x="5989638" y="3082669"/>
+            <a:ext cx="4754562" cy="2429386"/>
           </a:xfrm>
           <a:prstGeom prst="rect">
             <a:avLst/>
           </a:prstGeom>
-          <a:ln w="19050">
+          <a:ln>
             <a:solidFill>
-              <a:schemeClr val="accent2">
-                <a:lumMod val="50000"/>
-              </a:schemeClr>
+              <a:schemeClr val="accent1"/>
             </a:solidFill>
           </a:ln>
         </p:spPr>
@@ -24301,7 +25087,7 @@
     </p:spTree>
     <p:extLst>
       <p:ext uri="{BB962C8B-B14F-4D97-AF65-F5344CB8AC3E}">
-        <p14:creationId xmlns:p14="http://schemas.microsoft.com/office/powerpoint/2010/main" val="229161001"/>
+        <p14:creationId xmlns:p14="http://schemas.microsoft.com/office/powerpoint/2010/main" val="1985833327"/>
       </p:ext>
     </p:extLst>
   </p:cSld>
@@ -24333,7 +25119,7 @@
           <p:cNvPr id="2" name="Title 1">
             <a:extLst>
               <a:ext uri="{FF2B5EF4-FFF2-40B4-BE49-F238E27FC236}">
-                <a16:creationId xmlns:a16="http://schemas.microsoft.com/office/drawing/2014/main" id="{5B87CF65-8203-45A0-8A1D-449B3DDD5664}"/>
+                <a16:creationId xmlns:a16="http://schemas.microsoft.com/office/drawing/2014/main" id="{48BFBF90-10B9-45B5-A00F-27198C8138FC}"/>
               </a:ext>
             </a:extLst>
           </p:cNvPr>
@@ -24350,10 +25136,9 @@
           <a:lstStyle/>
           <a:p>
             <a:r>
-              <a:rPr lang="en-GB" dirty="0"/>
-              <a:t>Data Lake</a:t>
+              <a:rPr lang="en-IN" dirty="0"/>
+              <a:t>Data lake</a:t>
             </a:r>
-            <a:endParaRPr lang="en-IN" dirty="0"/>
           </a:p>
         </p:txBody>
       </p:sp>
@@ -24362,7 +25147,7 @@
           <p:cNvPr id="3" name="Content Placeholder 2">
             <a:extLst>
               <a:ext uri="{FF2B5EF4-FFF2-40B4-BE49-F238E27FC236}">
-                <a16:creationId xmlns:a16="http://schemas.microsoft.com/office/drawing/2014/main" id="{86CBC334-2225-4ED6-8E26-6DDD7BD9E2FA}"/>
+                <a16:creationId xmlns:a16="http://schemas.microsoft.com/office/drawing/2014/main" id="{A42D161F-42D8-4350-B1ED-E52224166836}"/>
               </a:ext>
             </a:extLst>
           </p:cNvPr>
@@ -24370,27 +25155,27 @@
             <a:spLocks noGrp="1"/>
           </p:cNvSpPr>
           <p:nvPr>
-            <p:ph idx="1"/>
+            <p:ph sz="half" idx="1"/>
           </p:nvPr>
         </p:nvSpPr>
         <p:spPr>
           <a:xfrm>
-            <a:off x="1024128" y="2299063"/>
-            <a:ext cx="4743626" cy="4023360"/>
+            <a:off x="1024127" y="2286000"/>
+            <a:ext cx="9720072" cy="4023360"/>
           </a:xfrm>
         </p:spPr>
         <p:txBody>
           <a:bodyPr>
-            <a:normAutofit fontScale="85000" lnSpcReduction="10000"/>
+            <a:normAutofit/>
           </a:bodyPr>
           <a:lstStyle/>
           <a:p>
             <a:r>
-              <a:rPr lang="en-GB" dirty="0"/>
+              <a:rPr lang="en-GB" sz="1500" dirty="0"/>
               <a:t>* </a:t>
             </a:r>
             <a:r>
-              <a:rPr lang="en-GB" dirty="0">
+              <a:rPr lang="en-GB" sz="1500" dirty="0">
                 <a:solidFill>
                   <a:srgbClr val="0070C0"/>
                 </a:solidFill>
@@ -24400,7 +25185,7 @@
           </a:p>
           <a:p>
             <a:r>
-              <a:rPr lang="en-GB" dirty="0">
+              <a:rPr lang="en-GB" sz="1500" dirty="0">
                 <a:solidFill>
                   <a:srgbClr val="0070C0"/>
                 </a:solidFill>
@@ -24409,7 +25194,7 @@
             </a:r>
           </a:p>
           <a:p>
-            <a:endParaRPr lang="en-GB" dirty="0">
+            <a:endParaRPr lang="en-GB" sz="1500" dirty="0">
               <a:solidFill>
                 <a:srgbClr val="0070C0"/>
               </a:solidFill>
@@ -24420,8 +25205,8 @@
               <a:buNone/>
             </a:pPr>
             <a:r>
-              <a:rPr lang="en-GB" dirty="0"/>
-              <a:t>* Recommended when,</a:t>
+              <a:rPr lang="en-GB" sz="1500" dirty="0"/>
+              <a:t>* Recommended,</a:t>
             </a:r>
           </a:p>
           <a:p>
@@ -24429,23 +25214,23 @@
               <a:buNone/>
             </a:pPr>
             <a:r>
-              <a:rPr lang="en-GB" sz="1800" dirty="0"/>
-              <a:t> - Have </a:t>
+              <a:rPr lang="en-GB" sz="1500" dirty="0"/>
+              <a:t> - Must store </a:t>
             </a:r>
             <a:r>
-              <a:rPr lang="en-GB" sz="1800" i="1" dirty="0"/>
+              <a:rPr lang="en-GB" sz="1500" i="1" dirty="0"/>
               <a:t>all types</a:t>
             </a:r>
             <a:r>
-              <a:rPr lang="en-GB" sz="1800" dirty="0"/>
+              <a:rPr lang="en-GB" sz="1500" dirty="0"/>
               <a:t> of data of </a:t>
             </a:r>
             <a:r>
-              <a:rPr lang="en-GB" sz="1800" i="1" dirty="0"/>
+              <a:rPr lang="en-GB" sz="1500" i="1" dirty="0"/>
               <a:t>any size.</a:t>
             </a:r>
             <a:r>
-              <a:rPr lang="en-GB" sz="1800" dirty="0"/>
+              <a:rPr lang="en-GB" sz="1500" dirty="0"/>
               <a:t> </a:t>
             </a:r>
           </a:p>
@@ -24454,16 +25239,8 @@
               <a:buNone/>
             </a:pPr>
             <a:r>
-              <a:rPr lang="en-GB" sz="1800" dirty="0"/>
-              <a:t> - Store now but have </a:t>
-            </a:r>
-            <a:r>
-              <a:rPr lang="en-GB" sz="1800" i="1" dirty="0"/>
-              <a:t>no immediate plan about analytics</a:t>
-            </a:r>
-            <a:r>
-              <a:rPr lang="en-GB" sz="1800" dirty="0"/>
-              <a:t>. </a:t>
+              <a:rPr lang="en-GB" sz="1500" dirty="0"/>
+              <a:t> - Query over large datasets. </a:t>
             </a:r>
           </a:p>
           <a:p>
@@ -24471,23 +25248,15 @@
               <a:buNone/>
             </a:pPr>
             <a:r>
-              <a:rPr lang="en-GB" sz="1800" dirty="0"/>
-              <a:t> - I</a:t>
-            </a:r>
-            <a:r>
-              <a:rPr lang="en-GB" sz="1800" i="1" dirty="0"/>
-              <a:t>nternal analytics</a:t>
-            </a:r>
-            <a:r>
-              <a:rPr lang="en-GB" sz="1800" dirty="0"/>
-              <a:t> – dump all; play as and when you need.</a:t>
+              <a:rPr lang="en-GB" sz="1500" dirty="0"/>
+              <a:t> - Store now; play later as and when you need. (Internal analytics).</a:t>
             </a:r>
           </a:p>
           <a:p>
             <a:pPr marL="0" indent="0">
               <a:buNone/>
             </a:pPr>
-            <a:endParaRPr lang="en-GB" sz="1800" dirty="0">
+            <a:endParaRPr lang="en-GB" sz="1500" dirty="0">
               <a:solidFill>
                 <a:srgbClr val="0070C0"/>
               </a:solidFill>
@@ -24498,8 +25267,8 @@
               <a:buNone/>
             </a:pPr>
             <a:r>
-              <a:rPr lang="en-GB" dirty="0"/>
-              <a:t>Not recommended when, </a:t>
+              <a:rPr lang="en-GB" sz="1500" dirty="0"/>
+              <a:t>* Not recommended, </a:t>
             </a:r>
           </a:p>
           <a:p>
@@ -24507,58 +25276,24 @@
               <a:buNone/>
             </a:pPr>
             <a:r>
-              <a:rPr lang="en-GB" sz="1800" dirty="0"/>
+              <a:rPr lang="en-GB" sz="1500" dirty="0"/>
               <a:t> - Data stored should be readily available for analytics upon which users would create reports.</a:t>
             </a:r>
-            <a:endParaRPr lang="en-IN" sz="1800" dirty="0">
+            <a:endParaRPr lang="en-IN" sz="1500" dirty="0">
               <a:solidFill>
                 <a:srgbClr val="0070C0"/>
               </a:solidFill>
             </a:endParaRPr>
           </a:p>
+          <a:p>
+            <a:endParaRPr lang="en-IN" sz="1500" dirty="0"/>
+          </a:p>
         </p:txBody>
       </p:sp>
-      <p:pic>
-        <p:nvPicPr>
-          <p:cNvPr id="5" name="Picture 4">
-            <a:extLst>
-              <a:ext uri="{FF2B5EF4-FFF2-40B4-BE49-F238E27FC236}">
-                <a16:creationId xmlns:a16="http://schemas.microsoft.com/office/drawing/2014/main" id="{EDFC0EC8-4EC0-438D-BAF1-34BE7FEE111B}"/>
-              </a:ext>
-            </a:extLst>
-          </p:cNvPr>
-          <p:cNvPicPr>
-            <a:picLocks noChangeAspect="1"/>
-          </p:cNvPicPr>
-          <p:nvPr/>
-        </p:nvPicPr>
-        <p:blipFill>
-          <a:blip r:embed="rId3"/>
-          <a:stretch>
-            <a:fillRect/>
-          </a:stretch>
-        </p:blipFill>
-        <p:spPr>
-          <a:xfrm>
-            <a:off x="5884164" y="585216"/>
-            <a:ext cx="6144482" cy="6030167"/>
-          </a:xfrm>
-          <a:prstGeom prst="rect">
-            <a:avLst/>
-          </a:prstGeom>
-          <a:ln w="19050">
-            <a:solidFill>
-              <a:schemeClr val="accent2">
-                <a:lumMod val="50000"/>
-              </a:schemeClr>
-            </a:solidFill>
-          </a:ln>
-        </p:spPr>
-      </p:pic>
     </p:spTree>
     <p:extLst>
       <p:ext uri="{BB962C8B-B14F-4D97-AF65-F5344CB8AC3E}">
-        <p14:creationId xmlns:p14="http://schemas.microsoft.com/office/powerpoint/2010/main" val="3586273789"/>
+        <p14:creationId xmlns:p14="http://schemas.microsoft.com/office/powerpoint/2010/main" val="3257875096"/>
       </p:ext>
     </p:extLst>
   </p:cSld>
@@ -24587,10 +25322,10 @@
       </p:grpSpPr>
       <p:sp>
         <p:nvSpPr>
-          <p:cNvPr id="14" name="Title 1">
+          <p:cNvPr id="2" name="Title 1">
             <a:extLst>
               <a:ext uri="{FF2B5EF4-FFF2-40B4-BE49-F238E27FC236}">
-                <a16:creationId xmlns:a16="http://schemas.microsoft.com/office/drawing/2014/main" id="{E5EAE4DA-4C16-41B8-8339-A43677534317}"/>
+                <a16:creationId xmlns:a16="http://schemas.microsoft.com/office/drawing/2014/main" id="{7B1BF93F-2BD9-4639-B86D-6E456BAA2C2C}"/>
               </a:ext>
             </a:extLst>
           </p:cNvPr>
@@ -24601,57 +25336,62 @@
             <p:ph type="title"/>
           </p:nvPr>
         </p:nvSpPr>
-        <p:spPr>
-          <a:xfrm>
-            <a:off x="1235964" y="167204"/>
-            <a:ext cx="9720072" cy="1499616"/>
-          </a:xfrm>
-        </p:spPr>
+        <p:spPr/>
         <p:txBody>
           <a:bodyPr/>
           <a:lstStyle/>
           <a:p>
             <a:r>
-              <a:rPr lang="en-GB" dirty="0"/>
-              <a:t>HYBRID Data architecture</a:t>
+              <a:rPr lang="en-IN" dirty="0"/>
+              <a:t>Data lake</a:t>
             </a:r>
-            <a:endParaRPr lang="en-IN" dirty="0"/>
           </a:p>
         </p:txBody>
       </p:sp>
       <p:pic>
         <p:nvPicPr>
-          <p:cNvPr id="15" name="Picture 14">
+          <p:cNvPr id="5" name="Content Placeholder 4">
             <a:extLst>
               <a:ext uri="{FF2B5EF4-FFF2-40B4-BE49-F238E27FC236}">
-                <a16:creationId xmlns:a16="http://schemas.microsoft.com/office/drawing/2014/main" id="{E6F2DF4B-662D-415D-B700-6D4C643F4B8A}"/>
+                <a16:creationId xmlns:a16="http://schemas.microsoft.com/office/drawing/2014/main" id="{0BB2C593-4BFA-484F-919D-49E6AB12AD8E}"/>
               </a:ext>
             </a:extLst>
           </p:cNvPr>
           <p:cNvPicPr>
-            <a:picLocks noChangeAspect="1"/>
+            <a:picLocks noGrp="1" noChangeAspect="1"/>
           </p:cNvPicPr>
-          <p:nvPr/>
+          <p:nvPr>
+            <p:ph idx="1"/>
+          </p:nvPr>
         </p:nvPicPr>
-        <p:blipFill rotWithShape="1">
-          <a:blip r:embed="rId3"/>
-          <a:srcRect t="24305"/>
-          <a:stretch/>
+        <p:blipFill>
+          <a:blip r:embed="rId2">
+            <a:extLst>
+              <a:ext uri="{28A0092B-C50C-407E-A947-70E740481C1C}">
+                <a14:useLocalDpi xmlns:a14="http://schemas.microsoft.com/office/drawing/2010/main" val="0"/>
+              </a:ext>
+            </a:extLst>
+          </a:blip>
+          <a:stretch>
+            <a:fillRect/>
+          </a:stretch>
         </p:blipFill>
         <p:spPr>
           <a:xfrm>
-            <a:off x="0" y="1666820"/>
-            <a:ext cx="12192000" cy="5191179"/>
+            <a:off x="1462396" y="2286000"/>
+            <a:ext cx="8843345" cy="4022725"/>
           </a:xfrm>
-          <a:prstGeom prst="rect">
-            <a:avLst/>
-          </a:prstGeom>
+          <a:ln w="19050">
+            <a:solidFill>
+              <a:schemeClr val="accent1"/>
+            </a:solidFill>
+          </a:ln>
         </p:spPr>
       </p:pic>
     </p:spTree>
     <p:extLst>
       <p:ext uri="{BB962C8B-B14F-4D97-AF65-F5344CB8AC3E}">
-        <p14:creationId xmlns:p14="http://schemas.microsoft.com/office/powerpoint/2010/main" val="3659286017"/>
+        <p14:creationId xmlns:p14="http://schemas.microsoft.com/office/powerpoint/2010/main" val="2780792555"/>
       </p:ext>
     </p:extLst>
   </p:cSld>

</xml_diff>